<commit_message>
alteracoes na demonstracao da api
</commit_message>
<xml_diff>
--- a/bbb-api-demo/src/main/webapp/Virtools.pptx
+++ b/bbb-api-demo/src/main/webapp/Virtools.pptx
@@ -3,7 +3,7 @@
 <p:presentation xmlns:a="http://schemas.openxmlformats.org/drawingml/2006/main" xmlns:p="http://schemas.openxmlformats.org/presentationml/2006/main" xmlns:r="http://schemas.openxmlformats.org/officeDocument/2006/relationships">
   <p:sldMasterIdLst>
     <p:sldMasterId id="2147483648" r:id="rId2"/>
-    <p:sldMasterId id="2147483650" r:id="rId3"/>
+    <p:sldMasterId id="2147483661" r:id="rId3"/>
   </p:sldMasterIdLst>
   <p:sldIdLst>
     <p:sldId id="256" r:id="rId4"/>
@@ -13,13 +13,13 @@
     <p:sldId id="260" r:id="rId8"/>
   </p:sldIdLst>
   <p:sldSz cx="9144000" cy="6858000"/>
-  <p:notesSz cx="7559675" cy="10691812"/>
+  <p:notesSz cx="7772400" cy="10058400"/>
 </p:presentation>
 </file>
 
 <file path=ppt/slideLayouts/slideLayout1.xml><?xml version="1.0" encoding="utf-8"?>
-<p:sldLayout xmlns:a="http://schemas.openxmlformats.org/drawingml/2006/main" xmlns:p="http://schemas.openxmlformats.org/presentationml/2006/main" xmlns:r="http://schemas.openxmlformats.org/officeDocument/2006/relationships" preserve="1" type="title">
-  <p:cSld name="Title Slide">
+<p:sldLayout xmlns:a="http://schemas.openxmlformats.org/drawingml/2006/main" xmlns:p="http://schemas.openxmlformats.org/presentationml/2006/main" xmlns:r="http://schemas.openxmlformats.org/officeDocument/2006/relationships" preserve="1" type="blank">
+  <p:cSld name="Blank Slide">
     <p:spTree>
       <p:nvGrpSpPr>
         <p:cNvPr id="1" name=""/>
@@ -39,8 +39,385 @@
 </p:sldLayout>
 </file>
 
-<file path=ppt/slideLayouts/slideLayout2.xml><?xml version="1.0" encoding="utf-8"?>
-<p:sldLayout xmlns:a="http://schemas.openxmlformats.org/drawingml/2006/main" xmlns:p="http://schemas.openxmlformats.org/presentationml/2006/main" xmlns:r="http://schemas.openxmlformats.org/officeDocument/2006/relationships" preserve="1" type="title">
+<file path=ppt/slideLayouts/slideLayout10.xml><?xml version="1.0" encoding="utf-8"?>
+<p:sldLayout xmlns:a="http://schemas.openxmlformats.org/drawingml/2006/main" xmlns:p="http://schemas.openxmlformats.org/presentationml/2006/main" xmlns:r="http://schemas.openxmlformats.org/officeDocument/2006/relationships" preserve="1" type="objOverTx">
+  <p:cSld name="Title, Content over Content">
+    <p:spTree>
+      <p:nvGrpSpPr>
+        <p:cNvPr id="1" name=""/>
+        <p:cNvGrpSpPr/>
+        <p:nvPr/>
+      </p:nvGrpSpPr>
+      <p:grpSpPr>
+        <a:xfrm>
+          <a:off x="0" y="0"/>
+          <a:ext cx="0" cy="0"/>
+          <a:chOff x="0" y="0"/>
+          <a:chExt cx="0" cy="0"/>
+        </a:xfrm>
+      </p:grpSpPr>
+      <p:sp>
+        <p:nvSpPr>
+          <p:cNvPr id="23" name="PlaceHolder 1"/>
+          <p:cNvSpPr>
+            <a:spLocks noGrp="1"/>
+          </p:cNvSpPr>
+          <p:nvPr>
+            <p:ph type="title"/>
+          </p:nvPr>
+        </p:nvSpPr>
+        <p:spPr>
+          <a:xfrm>
+            <a:off x="457200" y="273600"/>
+            <a:ext cx="8229240" cy="1145160"/>
+          </a:xfrm>
+          <a:prstGeom prst="rect">
+            <a:avLst/>
+          </a:prstGeom>
+        </p:spPr>
+        <p:txBody>
+          <a:bodyPr anchor="ctr" bIns="0" lIns="0" rIns="0" tIns="0" wrap="none"/>
+          <a:p>
+            <a:pPr algn="ctr"/>
+            <a:endParaRPr/>
+          </a:p>
+        </p:txBody>
+      </p:sp>
+      <p:sp>
+        <p:nvSpPr>
+          <p:cNvPr id="24" name="PlaceHolder 2"/>
+          <p:cNvSpPr>
+            <a:spLocks noGrp="1"/>
+          </p:cNvSpPr>
+          <p:nvPr>
+            <p:ph type="body"/>
+          </p:nvPr>
+        </p:nvSpPr>
+        <p:spPr>
+          <a:xfrm>
+            <a:off x="457200" y="1604520"/>
+            <a:ext cx="8046360" cy="1896840"/>
+          </a:xfrm>
+          <a:prstGeom prst="rect">
+            <a:avLst/>
+          </a:prstGeom>
+        </p:spPr>
+        <p:txBody>
+          <a:bodyPr bIns="0" lIns="0" rIns="0" tIns="0" wrap="none"/>
+          <a:p>
+            <a:endParaRPr/>
+          </a:p>
+        </p:txBody>
+      </p:sp>
+      <p:sp>
+        <p:nvSpPr>
+          <p:cNvPr id="25" name="PlaceHolder 3"/>
+          <p:cNvSpPr>
+            <a:spLocks noGrp="1"/>
+          </p:cNvSpPr>
+          <p:nvPr>
+            <p:ph type="body"/>
+          </p:nvPr>
+        </p:nvSpPr>
+        <p:spPr>
+          <a:xfrm>
+            <a:off x="457200" y="3681720"/>
+            <a:ext cx="8046360" cy="1896840"/>
+          </a:xfrm>
+          <a:prstGeom prst="rect">
+            <a:avLst/>
+          </a:prstGeom>
+        </p:spPr>
+        <p:txBody>
+          <a:bodyPr bIns="0" lIns="0" rIns="0" tIns="0" wrap="none"/>
+          <a:p>
+            <a:endParaRPr/>
+          </a:p>
+        </p:txBody>
+      </p:sp>
+    </p:spTree>
+  </p:cSld>
+</p:sldLayout>
+</file>
+
+<file path=ppt/slideLayouts/slideLayout11.xml><?xml version="1.0" encoding="utf-8"?>
+<p:sldLayout xmlns:a="http://schemas.openxmlformats.org/drawingml/2006/main" xmlns:p="http://schemas.openxmlformats.org/presentationml/2006/main" xmlns:r="http://schemas.openxmlformats.org/officeDocument/2006/relationships" preserve="1" type="fourObj">
+  <p:cSld name="Title, 4 Content">
+    <p:spTree>
+      <p:nvGrpSpPr>
+        <p:cNvPr id="1" name=""/>
+        <p:cNvGrpSpPr/>
+        <p:nvPr/>
+      </p:nvGrpSpPr>
+      <p:grpSpPr>
+        <a:xfrm>
+          <a:off x="0" y="0"/>
+          <a:ext cx="0" cy="0"/>
+          <a:chOff x="0" y="0"/>
+          <a:chExt cx="0" cy="0"/>
+        </a:xfrm>
+      </p:grpSpPr>
+      <p:sp>
+        <p:nvSpPr>
+          <p:cNvPr id="26" name="PlaceHolder 1"/>
+          <p:cNvSpPr>
+            <a:spLocks noGrp="1"/>
+          </p:cNvSpPr>
+          <p:nvPr>
+            <p:ph type="title"/>
+          </p:nvPr>
+        </p:nvSpPr>
+        <p:spPr>
+          <a:xfrm>
+            <a:off x="457200" y="273600"/>
+            <a:ext cx="8229240" cy="1145160"/>
+          </a:xfrm>
+          <a:prstGeom prst="rect">
+            <a:avLst/>
+          </a:prstGeom>
+        </p:spPr>
+        <p:txBody>
+          <a:bodyPr anchor="ctr" bIns="0" lIns="0" rIns="0" tIns="0" wrap="none"/>
+          <a:p>
+            <a:pPr algn="ctr"/>
+            <a:endParaRPr/>
+          </a:p>
+        </p:txBody>
+      </p:sp>
+      <p:sp>
+        <p:nvSpPr>
+          <p:cNvPr id="27" name="PlaceHolder 2"/>
+          <p:cNvSpPr>
+            <a:spLocks noGrp="1"/>
+          </p:cNvSpPr>
+          <p:nvPr>
+            <p:ph type="body"/>
+          </p:nvPr>
+        </p:nvSpPr>
+        <p:spPr>
+          <a:xfrm>
+            <a:off x="457200" y="1604520"/>
+            <a:ext cx="3926160" cy="1896840"/>
+          </a:xfrm>
+          <a:prstGeom prst="rect">
+            <a:avLst/>
+          </a:prstGeom>
+        </p:spPr>
+        <p:txBody>
+          <a:bodyPr bIns="0" lIns="0" rIns="0" tIns="0" wrap="none"/>
+          <a:p>
+            <a:endParaRPr/>
+          </a:p>
+        </p:txBody>
+      </p:sp>
+      <p:sp>
+        <p:nvSpPr>
+          <p:cNvPr id="28" name="PlaceHolder 3"/>
+          <p:cNvSpPr>
+            <a:spLocks noGrp="1"/>
+          </p:cNvSpPr>
+          <p:nvPr>
+            <p:ph type="body"/>
+          </p:nvPr>
+        </p:nvSpPr>
+        <p:spPr>
+          <a:xfrm>
+            <a:off x="4579920" y="1604520"/>
+            <a:ext cx="3926160" cy="1896840"/>
+          </a:xfrm>
+          <a:prstGeom prst="rect">
+            <a:avLst/>
+          </a:prstGeom>
+        </p:spPr>
+        <p:txBody>
+          <a:bodyPr bIns="0" lIns="0" rIns="0" tIns="0" wrap="none"/>
+          <a:p>
+            <a:endParaRPr/>
+          </a:p>
+        </p:txBody>
+      </p:sp>
+      <p:sp>
+        <p:nvSpPr>
+          <p:cNvPr id="29" name="PlaceHolder 4"/>
+          <p:cNvSpPr>
+            <a:spLocks noGrp="1"/>
+          </p:cNvSpPr>
+          <p:nvPr>
+            <p:ph type="body"/>
+          </p:nvPr>
+        </p:nvSpPr>
+        <p:spPr>
+          <a:xfrm>
+            <a:off x="4579920" y="3681720"/>
+            <a:ext cx="3926160" cy="1896840"/>
+          </a:xfrm>
+          <a:prstGeom prst="rect">
+            <a:avLst/>
+          </a:prstGeom>
+        </p:spPr>
+        <p:txBody>
+          <a:bodyPr bIns="0" lIns="0" rIns="0" tIns="0" wrap="none"/>
+          <a:p>
+            <a:endParaRPr/>
+          </a:p>
+        </p:txBody>
+      </p:sp>
+      <p:sp>
+        <p:nvSpPr>
+          <p:cNvPr id="30" name="PlaceHolder 5"/>
+          <p:cNvSpPr>
+            <a:spLocks noGrp="1"/>
+          </p:cNvSpPr>
+          <p:nvPr>
+            <p:ph type="body"/>
+          </p:nvPr>
+        </p:nvSpPr>
+        <p:spPr>
+          <a:xfrm>
+            <a:off x="457200" y="3681720"/>
+            <a:ext cx="3926160" cy="1896840"/>
+          </a:xfrm>
+          <a:prstGeom prst="rect">
+            <a:avLst/>
+          </a:prstGeom>
+        </p:spPr>
+        <p:txBody>
+          <a:bodyPr bIns="0" lIns="0" rIns="0" tIns="0" wrap="none"/>
+          <a:p>
+            <a:endParaRPr/>
+          </a:p>
+        </p:txBody>
+      </p:sp>
+    </p:spTree>
+  </p:cSld>
+</p:sldLayout>
+</file>
+
+<file path=ppt/slideLayouts/slideLayout12.xml><?xml version="1.0" encoding="utf-8"?>
+<p:sldLayout xmlns:a="http://schemas.openxmlformats.org/drawingml/2006/main" xmlns:p="http://schemas.openxmlformats.org/presentationml/2006/main" xmlns:r="http://schemas.openxmlformats.org/officeDocument/2006/relationships" preserve="1" type="blank">
+  <p:cSld name="Title, 6 Content">
+    <p:spTree>
+      <p:nvGrpSpPr>
+        <p:cNvPr id="1" name=""/>
+        <p:cNvGrpSpPr/>
+        <p:nvPr/>
+      </p:nvGrpSpPr>
+      <p:grpSpPr>
+        <a:xfrm>
+          <a:off x="0" y="0"/>
+          <a:ext cx="0" cy="0"/>
+          <a:chOff x="0" y="0"/>
+          <a:chExt cx="0" cy="0"/>
+        </a:xfrm>
+      </p:grpSpPr>
+      <p:sp>
+        <p:nvSpPr>
+          <p:cNvPr id="31" name="PlaceHolder 1"/>
+          <p:cNvSpPr>
+            <a:spLocks noGrp="1"/>
+          </p:cNvSpPr>
+          <p:nvPr>
+            <p:ph type="title"/>
+          </p:nvPr>
+        </p:nvSpPr>
+        <p:spPr>
+          <a:xfrm>
+            <a:off x="457200" y="273600"/>
+            <a:ext cx="8229240" cy="1145160"/>
+          </a:xfrm>
+          <a:prstGeom prst="rect">
+            <a:avLst/>
+          </a:prstGeom>
+        </p:spPr>
+        <p:txBody>
+          <a:bodyPr anchor="ctr" bIns="0" lIns="0" rIns="0" tIns="0" wrap="none"/>
+          <a:p>
+            <a:pPr algn="ctr"/>
+            <a:endParaRPr/>
+          </a:p>
+        </p:txBody>
+      </p:sp>
+      <p:sp>
+        <p:nvSpPr>
+          <p:cNvPr id="32" name="PlaceHolder 2"/>
+          <p:cNvSpPr>
+            <a:spLocks noGrp="1"/>
+          </p:cNvSpPr>
+          <p:nvPr>
+            <p:ph type="body"/>
+          </p:nvPr>
+        </p:nvSpPr>
+        <p:spPr>
+          <a:xfrm>
+            <a:off x="457200" y="1604520"/>
+            <a:ext cx="3926160" cy="1896840"/>
+          </a:xfrm>
+          <a:prstGeom prst="rect">
+            <a:avLst/>
+          </a:prstGeom>
+        </p:spPr>
+        <p:txBody>
+          <a:bodyPr bIns="0" lIns="0" rIns="0" tIns="0" wrap="none"/>
+          <a:p>
+            <a:endParaRPr/>
+          </a:p>
+        </p:txBody>
+      </p:sp>
+      <p:sp>
+        <p:nvSpPr>
+          <p:cNvPr id="33" name="PlaceHolder 3"/>
+          <p:cNvSpPr>
+            <a:spLocks noGrp="1"/>
+          </p:cNvSpPr>
+          <p:nvPr>
+            <p:ph type="body"/>
+          </p:nvPr>
+        </p:nvSpPr>
+        <p:spPr>
+          <a:xfrm>
+            <a:off x="4579920" y="1604520"/>
+            <a:ext cx="3926160" cy="1896840"/>
+          </a:xfrm>
+          <a:prstGeom prst="rect">
+            <a:avLst/>
+          </a:prstGeom>
+        </p:spPr>
+        <p:txBody>
+          <a:bodyPr bIns="0" lIns="0" rIns="0" tIns="0" wrap="none"/>
+          <a:p>
+            <a:endParaRPr/>
+          </a:p>
+        </p:txBody>
+      </p:sp>
+    </p:spTree>
+  </p:cSld>
+</p:sldLayout>
+</file>
+
+<file path=ppt/slideLayouts/slideLayout13.xml><?xml version="1.0" encoding="utf-8"?>
+<p:sldLayout xmlns:a="http://schemas.openxmlformats.org/drawingml/2006/main" xmlns:p="http://schemas.openxmlformats.org/presentationml/2006/main" xmlns:r="http://schemas.openxmlformats.org/officeDocument/2006/relationships" preserve="1" type="blank">
+  <p:cSld name="Blank Slide">
+    <p:spTree>
+      <p:nvGrpSpPr>
+        <p:cNvPr id="1" name=""/>
+        <p:cNvGrpSpPr/>
+        <p:nvPr/>
+      </p:nvGrpSpPr>
+      <p:grpSpPr>
+        <a:xfrm>
+          <a:off x="0" y="0"/>
+          <a:ext cx="0" cy="0"/>
+          <a:chOff x="0" y="0"/>
+          <a:chExt cx="0" cy="0"/>
+        </a:xfrm>
+      </p:grpSpPr>
+    </p:spTree>
+  </p:cSld>
+</p:sldLayout>
+</file>
+
+<file path=ppt/slideLayouts/slideLayout14.xml><?xml version="1.0" encoding="utf-8"?>
+<p:sldLayout xmlns:a="http://schemas.openxmlformats.org/drawingml/2006/main" xmlns:p="http://schemas.openxmlformats.org/presentationml/2006/main" xmlns:r="http://schemas.openxmlformats.org/officeDocument/2006/relationships" preserve="1" type="tx">
   <p:cSld name="Title Slide">
     <p:spTree>
       <p:nvGrpSpPr>
@@ -56,6 +433,1801 @@
           <a:chExt cx="0" cy="0"/>
         </a:xfrm>
       </p:grpSpPr>
+      <p:sp>
+        <p:nvSpPr>
+          <p:cNvPr id="36" name="PlaceHolder 1"/>
+          <p:cNvSpPr>
+            <a:spLocks noGrp="1"/>
+          </p:cNvSpPr>
+          <p:nvPr>
+            <p:ph type="title"/>
+          </p:nvPr>
+        </p:nvSpPr>
+        <p:spPr>
+          <a:xfrm>
+            <a:off x="457200" y="273600"/>
+            <a:ext cx="8229240" cy="1145160"/>
+          </a:xfrm>
+          <a:prstGeom prst="rect">
+            <a:avLst/>
+          </a:prstGeom>
+        </p:spPr>
+        <p:txBody>
+          <a:bodyPr anchor="ctr" bIns="0" lIns="0" rIns="0" tIns="0" wrap="none"/>
+          <a:p>
+            <a:pPr algn="ctr"/>
+            <a:endParaRPr/>
+          </a:p>
+        </p:txBody>
+      </p:sp>
+      <p:sp>
+        <p:nvSpPr>
+          <p:cNvPr id="37" name="PlaceHolder 2"/>
+          <p:cNvSpPr>
+            <a:spLocks noGrp="1"/>
+          </p:cNvSpPr>
+          <p:nvPr>
+            <p:ph type="subTitle"/>
+          </p:nvPr>
+        </p:nvSpPr>
+        <p:spPr>
+          <a:xfrm>
+            <a:off x="457200" y="1604520"/>
+            <a:ext cx="8046360" cy="3977640"/>
+          </a:xfrm>
+          <a:prstGeom prst="rect">
+            <a:avLst/>
+          </a:prstGeom>
+        </p:spPr>
+        <p:txBody>
+          <a:bodyPr anchor="ctr" bIns="0" lIns="0" rIns="0" tIns="0" wrap="none"/>
+          <a:p>
+            <a:pPr algn="ctr"/>
+            <a:endParaRPr/>
+          </a:p>
+        </p:txBody>
+      </p:sp>
+    </p:spTree>
+  </p:cSld>
+</p:sldLayout>
+</file>
+
+<file path=ppt/slideLayouts/slideLayout15.xml><?xml version="1.0" encoding="utf-8"?>
+<p:sldLayout xmlns:a="http://schemas.openxmlformats.org/drawingml/2006/main" xmlns:p="http://schemas.openxmlformats.org/presentationml/2006/main" xmlns:r="http://schemas.openxmlformats.org/officeDocument/2006/relationships" preserve="1" type="obj">
+  <p:cSld name="Title, Content">
+    <p:spTree>
+      <p:nvGrpSpPr>
+        <p:cNvPr id="1" name=""/>
+        <p:cNvGrpSpPr/>
+        <p:nvPr/>
+      </p:nvGrpSpPr>
+      <p:grpSpPr>
+        <a:xfrm>
+          <a:off x="0" y="0"/>
+          <a:ext cx="0" cy="0"/>
+          <a:chOff x="0" y="0"/>
+          <a:chExt cx="0" cy="0"/>
+        </a:xfrm>
+      </p:grpSpPr>
+      <p:sp>
+        <p:nvSpPr>
+          <p:cNvPr id="38" name="PlaceHolder 1"/>
+          <p:cNvSpPr>
+            <a:spLocks noGrp="1"/>
+          </p:cNvSpPr>
+          <p:nvPr>
+            <p:ph type="title"/>
+          </p:nvPr>
+        </p:nvSpPr>
+        <p:spPr>
+          <a:xfrm>
+            <a:off x="457200" y="273600"/>
+            <a:ext cx="8229240" cy="1145160"/>
+          </a:xfrm>
+          <a:prstGeom prst="rect">
+            <a:avLst/>
+          </a:prstGeom>
+        </p:spPr>
+        <p:txBody>
+          <a:bodyPr anchor="ctr" bIns="0" lIns="0" rIns="0" tIns="0" wrap="none"/>
+          <a:p>
+            <a:pPr algn="ctr"/>
+            <a:endParaRPr/>
+          </a:p>
+        </p:txBody>
+      </p:sp>
+      <p:sp>
+        <p:nvSpPr>
+          <p:cNvPr id="39" name="PlaceHolder 2"/>
+          <p:cNvSpPr>
+            <a:spLocks noGrp="1"/>
+          </p:cNvSpPr>
+          <p:nvPr>
+            <p:ph type="body"/>
+          </p:nvPr>
+        </p:nvSpPr>
+        <p:spPr>
+          <a:xfrm>
+            <a:off x="457200" y="1604520"/>
+            <a:ext cx="8046360" cy="3977280"/>
+          </a:xfrm>
+          <a:prstGeom prst="rect">
+            <a:avLst/>
+          </a:prstGeom>
+        </p:spPr>
+        <p:txBody>
+          <a:bodyPr bIns="0" lIns="0" rIns="0" tIns="0" wrap="none"/>
+          <a:p>
+            <a:endParaRPr/>
+          </a:p>
+        </p:txBody>
+      </p:sp>
+    </p:spTree>
+  </p:cSld>
+</p:sldLayout>
+</file>
+
+<file path=ppt/slideLayouts/slideLayout16.xml><?xml version="1.0" encoding="utf-8"?>
+<p:sldLayout xmlns:a="http://schemas.openxmlformats.org/drawingml/2006/main" xmlns:p="http://schemas.openxmlformats.org/presentationml/2006/main" xmlns:r="http://schemas.openxmlformats.org/officeDocument/2006/relationships" preserve="1" type="twoObj">
+  <p:cSld name="Title, 2 Content">
+    <p:spTree>
+      <p:nvGrpSpPr>
+        <p:cNvPr id="1" name=""/>
+        <p:cNvGrpSpPr/>
+        <p:nvPr/>
+      </p:nvGrpSpPr>
+      <p:grpSpPr>
+        <a:xfrm>
+          <a:off x="0" y="0"/>
+          <a:ext cx="0" cy="0"/>
+          <a:chOff x="0" y="0"/>
+          <a:chExt cx="0" cy="0"/>
+        </a:xfrm>
+      </p:grpSpPr>
+      <p:sp>
+        <p:nvSpPr>
+          <p:cNvPr id="40" name="PlaceHolder 1"/>
+          <p:cNvSpPr>
+            <a:spLocks noGrp="1"/>
+          </p:cNvSpPr>
+          <p:nvPr>
+            <p:ph type="title"/>
+          </p:nvPr>
+        </p:nvSpPr>
+        <p:spPr>
+          <a:xfrm>
+            <a:off x="457200" y="273600"/>
+            <a:ext cx="8229240" cy="1145160"/>
+          </a:xfrm>
+          <a:prstGeom prst="rect">
+            <a:avLst/>
+          </a:prstGeom>
+        </p:spPr>
+        <p:txBody>
+          <a:bodyPr anchor="ctr" bIns="0" lIns="0" rIns="0" tIns="0" wrap="none"/>
+          <a:p>
+            <a:pPr algn="ctr"/>
+            <a:endParaRPr/>
+          </a:p>
+        </p:txBody>
+      </p:sp>
+      <p:sp>
+        <p:nvSpPr>
+          <p:cNvPr id="41" name="PlaceHolder 2"/>
+          <p:cNvSpPr>
+            <a:spLocks noGrp="1"/>
+          </p:cNvSpPr>
+          <p:nvPr>
+            <p:ph type="body"/>
+          </p:nvPr>
+        </p:nvSpPr>
+        <p:spPr>
+          <a:xfrm>
+            <a:off x="457200" y="1604520"/>
+            <a:ext cx="3926160" cy="3977280"/>
+          </a:xfrm>
+          <a:prstGeom prst="rect">
+            <a:avLst/>
+          </a:prstGeom>
+        </p:spPr>
+        <p:txBody>
+          <a:bodyPr bIns="0" lIns="0" rIns="0" tIns="0" wrap="none"/>
+          <a:p>
+            <a:endParaRPr/>
+          </a:p>
+        </p:txBody>
+      </p:sp>
+      <p:sp>
+        <p:nvSpPr>
+          <p:cNvPr id="42" name="PlaceHolder 3"/>
+          <p:cNvSpPr>
+            <a:spLocks noGrp="1"/>
+          </p:cNvSpPr>
+          <p:nvPr>
+            <p:ph type="body"/>
+          </p:nvPr>
+        </p:nvSpPr>
+        <p:spPr>
+          <a:xfrm>
+            <a:off x="4579920" y="1604520"/>
+            <a:ext cx="3926160" cy="3977280"/>
+          </a:xfrm>
+          <a:prstGeom prst="rect">
+            <a:avLst/>
+          </a:prstGeom>
+        </p:spPr>
+        <p:txBody>
+          <a:bodyPr bIns="0" lIns="0" rIns="0" tIns="0" wrap="none"/>
+          <a:p>
+            <a:endParaRPr/>
+          </a:p>
+        </p:txBody>
+      </p:sp>
+    </p:spTree>
+  </p:cSld>
+</p:sldLayout>
+</file>
+
+<file path=ppt/slideLayouts/slideLayout17.xml><?xml version="1.0" encoding="utf-8"?>
+<p:sldLayout xmlns:a="http://schemas.openxmlformats.org/drawingml/2006/main" xmlns:p="http://schemas.openxmlformats.org/presentationml/2006/main" xmlns:r="http://schemas.openxmlformats.org/officeDocument/2006/relationships" preserve="1" type="titleOnly">
+  <p:cSld name="Title Only">
+    <p:spTree>
+      <p:nvGrpSpPr>
+        <p:cNvPr id="1" name=""/>
+        <p:cNvGrpSpPr/>
+        <p:nvPr/>
+      </p:nvGrpSpPr>
+      <p:grpSpPr>
+        <a:xfrm>
+          <a:off x="0" y="0"/>
+          <a:ext cx="0" cy="0"/>
+          <a:chOff x="0" y="0"/>
+          <a:chExt cx="0" cy="0"/>
+        </a:xfrm>
+      </p:grpSpPr>
+      <p:sp>
+        <p:nvSpPr>
+          <p:cNvPr id="43" name="PlaceHolder 1"/>
+          <p:cNvSpPr>
+            <a:spLocks noGrp="1"/>
+          </p:cNvSpPr>
+          <p:nvPr>
+            <p:ph type="title"/>
+          </p:nvPr>
+        </p:nvSpPr>
+        <p:spPr>
+          <a:xfrm>
+            <a:off x="457200" y="273600"/>
+            <a:ext cx="8229240" cy="1145160"/>
+          </a:xfrm>
+          <a:prstGeom prst="rect">
+            <a:avLst/>
+          </a:prstGeom>
+        </p:spPr>
+        <p:txBody>
+          <a:bodyPr anchor="ctr" bIns="0" lIns="0" rIns="0" tIns="0" wrap="none"/>
+          <a:p>
+            <a:pPr algn="ctr"/>
+            <a:endParaRPr/>
+          </a:p>
+        </p:txBody>
+      </p:sp>
+    </p:spTree>
+  </p:cSld>
+</p:sldLayout>
+</file>
+
+<file path=ppt/slideLayouts/slideLayout18.xml><?xml version="1.0" encoding="utf-8"?>
+<p:sldLayout xmlns:a="http://schemas.openxmlformats.org/drawingml/2006/main" xmlns:p="http://schemas.openxmlformats.org/presentationml/2006/main" xmlns:r="http://schemas.openxmlformats.org/officeDocument/2006/relationships" preserve="1" type="objOnly">
+  <p:cSld name="Centered Text">
+    <p:spTree>
+      <p:nvGrpSpPr>
+        <p:cNvPr id="1" name=""/>
+        <p:cNvGrpSpPr/>
+        <p:nvPr/>
+      </p:nvGrpSpPr>
+      <p:grpSpPr>
+        <a:xfrm>
+          <a:off x="0" y="0"/>
+          <a:ext cx="0" cy="0"/>
+          <a:chOff x="0" y="0"/>
+          <a:chExt cx="0" cy="0"/>
+        </a:xfrm>
+      </p:grpSpPr>
+      <p:sp>
+        <p:nvSpPr>
+          <p:cNvPr id="44" name="PlaceHolder 1"/>
+          <p:cNvSpPr>
+            <a:spLocks noGrp="1"/>
+          </p:cNvSpPr>
+          <p:nvPr>
+            <p:ph type="subTitle"/>
+          </p:nvPr>
+        </p:nvSpPr>
+        <p:spPr>
+          <a:xfrm>
+            <a:off x="457200" y="273600"/>
+            <a:ext cx="8229240" cy="5308200"/>
+          </a:xfrm>
+          <a:prstGeom prst="rect">
+            <a:avLst/>
+          </a:prstGeom>
+        </p:spPr>
+        <p:txBody>
+          <a:bodyPr anchor="ctr" bIns="0" lIns="0" rIns="0" tIns="0" wrap="none"/>
+          <a:p>
+            <a:pPr algn="ctr"/>
+            <a:endParaRPr/>
+          </a:p>
+        </p:txBody>
+      </p:sp>
+    </p:spTree>
+  </p:cSld>
+</p:sldLayout>
+</file>
+
+<file path=ppt/slideLayouts/slideLayout19.xml><?xml version="1.0" encoding="utf-8"?>
+<p:sldLayout xmlns:a="http://schemas.openxmlformats.org/drawingml/2006/main" xmlns:p="http://schemas.openxmlformats.org/presentationml/2006/main" xmlns:r="http://schemas.openxmlformats.org/officeDocument/2006/relationships" preserve="1" type="twoObjAndObj">
+  <p:cSld name="Title, 2 Content and Content">
+    <p:spTree>
+      <p:nvGrpSpPr>
+        <p:cNvPr id="1" name=""/>
+        <p:cNvGrpSpPr/>
+        <p:nvPr/>
+      </p:nvGrpSpPr>
+      <p:grpSpPr>
+        <a:xfrm>
+          <a:off x="0" y="0"/>
+          <a:ext cx="0" cy="0"/>
+          <a:chOff x="0" y="0"/>
+          <a:chExt cx="0" cy="0"/>
+        </a:xfrm>
+      </p:grpSpPr>
+      <p:sp>
+        <p:nvSpPr>
+          <p:cNvPr id="45" name="PlaceHolder 1"/>
+          <p:cNvSpPr>
+            <a:spLocks noGrp="1"/>
+          </p:cNvSpPr>
+          <p:nvPr>
+            <p:ph type="title"/>
+          </p:nvPr>
+        </p:nvSpPr>
+        <p:spPr>
+          <a:xfrm>
+            <a:off x="457200" y="273600"/>
+            <a:ext cx="8229240" cy="1145160"/>
+          </a:xfrm>
+          <a:prstGeom prst="rect">
+            <a:avLst/>
+          </a:prstGeom>
+        </p:spPr>
+        <p:txBody>
+          <a:bodyPr anchor="ctr" bIns="0" lIns="0" rIns="0" tIns="0" wrap="none"/>
+          <a:p>
+            <a:pPr algn="ctr"/>
+            <a:endParaRPr/>
+          </a:p>
+        </p:txBody>
+      </p:sp>
+      <p:sp>
+        <p:nvSpPr>
+          <p:cNvPr id="46" name="PlaceHolder 2"/>
+          <p:cNvSpPr>
+            <a:spLocks noGrp="1"/>
+          </p:cNvSpPr>
+          <p:nvPr>
+            <p:ph type="body"/>
+          </p:nvPr>
+        </p:nvSpPr>
+        <p:spPr>
+          <a:xfrm>
+            <a:off x="457200" y="1604520"/>
+            <a:ext cx="3926160" cy="1896840"/>
+          </a:xfrm>
+          <a:prstGeom prst="rect">
+            <a:avLst/>
+          </a:prstGeom>
+        </p:spPr>
+        <p:txBody>
+          <a:bodyPr bIns="0" lIns="0" rIns="0" tIns="0" wrap="none"/>
+          <a:p>
+            <a:endParaRPr/>
+          </a:p>
+        </p:txBody>
+      </p:sp>
+      <p:sp>
+        <p:nvSpPr>
+          <p:cNvPr id="47" name="PlaceHolder 3"/>
+          <p:cNvSpPr>
+            <a:spLocks noGrp="1"/>
+          </p:cNvSpPr>
+          <p:nvPr>
+            <p:ph type="body"/>
+          </p:nvPr>
+        </p:nvSpPr>
+        <p:spPr>
+          <a:xfrm>
+            <a:off x="457200" y="3681720"/>
+            <a:ext cx="3926160" cy="1896840"/>
+          </a:xfrm>
+          <a:prstGeom prst="rect">
+            <a:avLst/>
+          </a:prstGeom>
+        </p:spPr>
+        <p:txBody>
+          <a:bodyPr bIns="0" lIns="0" rIns="0" tIns="0" wrap="none"/>
+          <a:p>
+            <a:endParaRPr/>
+          </a:p>
+        </p:txBody>
+      </p:sp>
+      <p:sp>
+        <p:nvSpPr>
+          <p:cNvPr id="48" name="PlaceHolder 4"/>
+          <p:cNvSpPr>
+            <a:spLocks noGrp="1"/>
+          </p:cNvSpPr>
+          <p:nvPr>
+            <p:ph type="body"/>
+          </p:nvPr>
+        </p:nvSpPr>
+        <p:spPr>
+          <a:xfrm>
+            <a:off x="4579920" y="1604520"/>
+            <a:ext cx="3926160" cy="3977280"/>
+          </a:xfrm>
+          <a:prstGeom prst="rect">
+            <a:avLst/>
+          </a:prstGeom>
+        </p:spPr>
+        <p:txBody>
+          <a:bodyPr bIns="0" lIns="0" rIns="0" tIns="0" wrap="none"/>
+          <a:p>
+            <a:endParaRPr/>
+          </a:p>
+        </p:txBody>
+      </p:sp>
+    </p:spTree>
+  </p:cSld>
+</p:sldLayout>
+</file>
+
+<file path=ppt/slideLayouts/slideLayout2.xml><?xml version="1.0" encoding="utf-8"?>
+<p:sldLayout xmlns:a="http://schemas.openxmlformats.org/drawingml/2006/main" xmlns:p="http://schemas.openxmlformats.org/presentationml/2006/main" xmlns:r="http://schemas.openxmlformats.org/officeDocument/2006/relationships" preserve="1" type="tx">
+  <p:cSld name="Title Slide">
+    <p:spTree>
+      <p:nvGrpSpPr>
+        <p:cNvPr id="1" name=""/>
+        <p:cNvGrpSpPr/>
+        <p:nvPr/>
+      </p:nvGrpSpPr>
+      <p:grpSpPr>
+        <a:xfrm>
+          <a:off x="0" y="0"/>
+          <a:ext cx="0" cy="0"/>
+          <a:chOff x="0" y="0"/>
+          <a:chExt cx="0" cy="0"/>
+        </a:xfrm>
+      </p:grpSpPr>
+      <p:sp>
+        <p:nvSpPr>
+          <p:cNvPr id="2" name="PlaceHolder 1"/>
+          <p:cNvSpPr>
+            <a:spLocks noGrp="1"/>
+          </p:cNvSpPr>
+          <p:nvPr>
+            <p:ph type="title"/>
+          </p:nvPr>
+        </p:nvSpPr>
+        <p:spPr>
+          <a:xfrm>
+            <a:off x="457200" y="273600"/>
+            <a:ext cx="8229240" cy="1145160"/>
+          </a:xfrm>
+          <a:prstGeom prst="rect">
+            <a:avLst/>
+          </a:prstGeom>
+        </p:spPr>
+        <p:txBody>
+          <a:bodyPr anchor="ctr" bIns="0" lIns="0" rIns="0" tIns="0" wrap="none"/>
+          <a:p>
+            <a:pPr algn="ctr"/>
+            <a:endParaRPr/>
+          </a:p>
+        </p:txBody>
+      </p:sp>
+      <p:sp>
+        <p:nvSpPr>
+          <p:cNvPr id="3" name="PlaceHolder 2"/>
+          <p:cNvSpPr>
+            <a:spLocks noGrp="1"/>
+          </p:cNvSpPr>
+          <p:nvPr>
+            <p:ph type="subTitle"/>
+          </p:nvPr>
+        </p:nvSpPr>
+        <p:spPr>
+          <a:xfrm>
+            <a:off x="457200" y="1604520"/>
+            <a:ext cx="8046360" cy="3977640"/>
+          </a:xfrm>
+          <a:prstGeom prst="rect">
+            <a:avLst/>
+          </a:prstGeom>
+        </p:spPr>
+        <p:txBody>
+          <a:bodyPr anchor="ctr" bIns="0" lIns="0" rIns="0" tIns="0" wrap="none"/>
+          <a:p>
+            <a:pPr algn="ctr"/>
+            <a:endParaRPr/>
+          </a:p>
+        </p:txBody>
+      </p:sp>
+    </p:spTree>
+  </p:cSld>
+</p:sldLayout>
+</file>
+
+<file path=ppt/slideLayouts/slideLayout20.xml><?xml version="1.0" encoding="utf-8"?>
+<p:sldLayout xmlns:a="http://schemas.openxmlformats.org/drawingml/2006/main" xmlns:p="http://schemas.openxmlformats.org/presentationml/2006/main" xmlns:r="http://schemas.openxmlformats.org/officeDocument/2006/relationships" preserve="1" type="objAndTwoObj">
+  <p:cSld name="Title Content and 2 Content">
+    <p:spTree>
+      <p:nvGrpSpPr>
+        <p:cNvPr id="1" name=""/>
+        <p:cNvGrpSpPr/>
+        <p:nvPr/>
+      </p:nvGrpSpPr>
+      <p:grpSpPr>
+        <a:xfrm>
+          <a:off x="0" y="0"/>
+          <a:ext cx="0" cy="0"/>
+          <a:chOff x="0" y="0"/>
+          <a:chExt cx="0" cy="0"/>
+        </a:xfrm>
+      </p:grpSpPr>
+      <p:sp>
+        <p:nvSpPr>
+          <p:cNvPr id="49" name="PlaceHolder 1"/>
+          <p:cNvSpPr>
+            <a:spLocks noGrp="1"/>
+          </p:cNvSpPr>
+          <p:nvPr>
+            <p:ph type="title"/>
+          </p:nvPr>
+        </p:nvSpPr>
+        <p:spPr>
+          <a:xfrm>
+            <a:off x="457200" y="273600"/>
+            <a:ext cx="8229240" cy="1145160"/>
+          </a:xfrm>
+          <a:prstGeom prst="rect">
+            <a:avLst/>
+          </a:prstGeom>
+        </p:spPr>
+        <p:txBody>
+          <a:bodyPr anchor="ctr" bIns="0" lIns="0" rIns="0" tIns="0" wrap="none"/>
+          <a:p>
+            <a:pPr algn="ctr"/>
+            <a:endParaRPr/>
+          </a:p>
+        </p:txBody>
+      </p:sp>
+      <p:sp>
+        <p:nvSpPr>
+          <p:cNvPr id="50" name="PlaceHolder 2"/>
+          <p:cNvSpPr>
+            <a:spLocks noGrp="1"/>
+          </p:cNvSpPr>
+          <p:nvPr>
+            <p:ph type="body"/>
+          </p:nvPr>
+        </p:nvSpPr>
+        <p:spPr>
+          <a:xfrm>
+            <a:off x="457200" y="1604520"/>
+            <a:ext cx="3926160" cy="3977280"/>
+          </a:xfrm>
+          <a:prstGeom prst="rect">
+            <a:avLst/>
+          </a:prstGeom>
+        </p:spPr>
+        <p:txBody>
+          <a:bodyPr bIns="0" lIns="0" rIns="0" tIns="0" wrap="none"/>
+          <a:p>
+            <a:endParaRPr/>
+          </a:p>
+        </p:txBody>
+      </p:sp>
+      <p:sp>
+        <p:nvSpPr>
+          <p:cNvPr id="51" name="PlaceHolder 3"/>
+          <p:cNvSpPr>
+            <a:spLocks noGrp="1"/>
+          </p:cNvSpPr>
+          <p:nvPr>
+            <p:ph type="body"/>
+          </p:nvPr>
+        </p:nvSpPr>
+        <p:spPr>
+          <a:xfrm>
+            <a:off x="4579920" y="1604520"/>
+            <a:ext cx="3926160" cy="1896840"/>
+          </a:xfrm>
+          <a:prstGeom prst="rect">
+            <a:avLst/>
+          </a:prstGeom>
+        </p:spPr>
+        <p:txBody>
+          <a:bodyPr bIns="0" lIns="0" rIns="0" tIns="0" wrap="none"/>
+          <a:p>
+            <a:endParaRPr/>
+          </a:p>
+        </p:txBody>
+      </p:sp>
+      <p:sp>
+        <p:nvSpPr>
+          <p:cNvPr id="52" name="PlaceHolder 4"/>
+          <p:cNvSpPr>
+            <a:spLocks noGrp="1"/>
+          </p:cNvSpPr>
+          <p:nvPr>
+            <p:ph type="body"/>
+          </p:nvPr>
+        </p:nvSpPr>
+        <p:spPr>
+          <a:xfrm>
+            <a:off x="4579920" y="3681720"/>
+            <a:ext cx="3926160" cy="1896840"/>
+          </a:xfrm>
+          <a:prstGeom prst="rect">
+            <a:avLst/>
+          </a:prstGeom>
+        </p:spPr>
+        <p:txBody>
+          <a:bodyPr bIns="0" lIns="0" rIns="0" tIns="0" wrap="none"/>
+          <a:p>
+            <a:endParaRPr/>
+          </a:p>
+        </p:txBody>
+      </p:sp>
+    </p:spTree>
+  </p:cSld>
+</p:sldLayout>
+</file>
+
+<file path=ppt/slideLayouts/slideLayout21.xml><?xml version="1.0" encoding="utf-8"?>
+<p:sldLayout xmlns:a="http://schemas.openxmlformats.org/drawingml/2006/main" xmlns:p="http://schemas.openxmlformats.org/presentationml/2006/main" xmlns:r="http://schemas.openxmlformats.org/officeDocument/2006/relationships" preserve="1" type="twoObjOverTx">
+  <p:cSld name="Title, 2 Content over Content">
+    <p:spTree>
+      <p:nvGrpSpPr>
+        <p:cNvPr id="1" name=""/>
+        <p:cNvGrpSpPr/>
+        <p:nvPr/>
+      </p:nvGrpSpPr>
+      <p:grpSpPr>
+        <a:xfrm>
+          <a:off x="0" y="0"/>
+          <a:ext cx="0" cy="0"/>
+          <a:chOff x="0" y="0"/>
+          <a:chExt cx="0" cy="0"/>
+        </a:xfrm>
+      </p:grpSpPr>
+      <p:sp>
+        <p:nvSpPr>
+          <p:cNvPr id="53" name="PlaceHolder 1"/>
+          <p:cNvSpPr>
+            <a:spLocks noGrp="1"/>
+          </p:cNvSpPr>
+          <p:nvPr>
+            <p:ph type="title"/>
+          </p:nvPr>
+        </p:nvSpPr>
+        <p:spPr>
+          <a:xfrm>
+            <a:off x="457200" y="273600"/>
+            <a:ext cx="8229240" cy="1145160"/>
+          </a:xfrm>
+          <a:prstGeom prst="rect">
+            <a:avLst/>
+          </a:prstGeom>
+        </p:spPr>
+        <p:txBody>
+          <a:bodyPr anchor="ctr" bIns="0" lIns="0" rIns="0" tIns="0" wrap="none"/>
+          <a:p>
+            <a:pPr algn="ctr"/>
+            <a:endParaRPr/>
+          </a:p>
+        </p:txBody>
+      </p:sp>
+      <p:sp>
+        <p:nvSpPr>
+          <p:cNvPr id="54" name="PlaceHolder 2"/>
+          <p:cNvSpPr>
+            <a:spLocks noGrp="1"/>
+          </p:cNvSpPr>
+          <p:nvPr>
+            <p:ph type="body"/>
+          </p:nvPr>
+        </p:nvSpPr>
+        <p:spPr>
+          <a:xfrm>
+            <a:off x="457200" y="1604520"/>
+            <a:ext cx="3926160" cy="1896840"/>
+          </a:xfrm>
+          <a:prstGeom prst="rect">
+            <a:avLst/>
+          </a:prstGeom>
+        </p:spPr>
+        <p:txBody>
+          <a:bodyPr bIns="0" lIns="0" rIns="0" tIns="0" wrap="none"/>
+          <a:p>
+            <a:endParaRPr/>
+          </a:p>
+        </p:txBody>
+      </p:sp>
+      <p:sp>
+        <p:nvSpPr>
+          <p:cNvPr id="55" name="PlaceHolder 3"/>
+          <p:cNvSpPr>
+            <a:spLocks noGrp="1"/>
+          </p:cNvSpPr>
+          <p:nvPr>
+            <p:ph type="body"/>
+          </p:nvPr>
+        </p:nvSpPr>
+        <p:spPr>
+          <a:xfrm>
+            <a:off x="4579920" y="1604520"/>
+            <a:ext cx="3926160" cy="1896840"/>
+          </a:xfrm>
+          <a:prstGeom prst="rect">
+            <a:avLst/>
+          </a:prstGeom>
+        </p:spPr>
+        <p:txBody>
+          <a:bodyPr bIns="0" lIns="0" rIns="0" tIns="0" wrap="none"/>
+          <a:p>
+            <a:endParaRPr/>
+          </a:p>
+        </p:txBody>
+      </p:sp>
+      <p:sp>
+        <p:nvSpPr>
+          <p:cNvPr id="56" name="PlaceHolder 4"/>
+          <p:cNvSpPr>
+            <a:spLocks noGrp="1"/>
+          </p:cNvSpPr>
+          <p:nvPr>
+            <p:ph type="body"/>
+          </p:nvPr>
+        </p:nvSpPr>
+        <p:spPr>
+          <a:xfrm>
+            <a:off x="457200" y="3681720"/>
+            <a:ext cx="8045640" cy="1896840"/>
+          </a:xfrm>
+          <a:prstGeom prst="rect">
+            <a:avLst/>
+          </a:prstGeom>
+        </p:spPr>
+        <p:txBody>
+          <a:bodyPr bIns="0" lIns="0" rIns="0" tIns="0" wrap="none"/>
+          <a:p>
+            <a:endParaRPr/>
+          </a:p>
+        </p:txBody>
+      </p:sp>
+    </p:spTree>
+  </p:cSld>
+</p:sldLayout>
+</file>
+
+<file path=ppt/slideLayouts/slideLayout22.xml><?xml version="1.0" encoding="utf-8"?>
+<p:sldLayout xmlns:a="http://schemas.openxmlformats.org/drawingml/2006/main" xmlns:p="http://schemas.openxmlformats.org/presentationml/2006/main" xmlns:r="http://schemas.openxmlformats.org/officeDocument/2006/relationships" preserve="1" type="objOverTx">
+  <p:cSld name="Title, Content over Content">
+    <p:spTree>
+      <p:nvGrpSpPr>
+        <p:cNvPr id="1" name=""/>
+        <p:cNvGrpSpPr/>
+        <p:nvPr/>
+      </p:nvGrpSpPr>
+      <p:grpSpPr>
+        <a:xfrm>
+          <a:off x="0" y="0"/>
+          <a:ext cx="0" cy="0"/>
+          <a:chOff x="0" y="0"/>
+          <a:chExt cx="0" cy="0"/>
+        </a:xfrm>
+      </p:grpSpPr>
+      <p:sp>
+        <p:nvSpPr>
+          <p:cNvPr id="57" name="PlaceHolder 1"/>
+          <p:cNvSpPr>
+            <a:spLocks noGrp="1"/>
+          </p:cNvSpPr>
+          <p:nvPr>
+            <p:ph type="title"/>
+          </p:nvPr>
+        </p:nvSpPr>
+        <p:spPr>
+          <a:xfrm>
+            <a:off x="457200" y="273600"/>
+            <a:ext cx="8229240" cy="1145160"/>
+          </a:xfrm>
+          <a:prstGeom prst="rect">
+            <a:avLst/>
+          </a:prstGeom>
+        </p:spPr>
+        <p:txBody>
+          <a:bodyPr anchor="ctr" bIns="0" lIns="0" rIns="0" tIns="0" wrap="none"/>
+          <a:p>
+            <a:pPr algn="ctr"/>
+            <a:endParaRPr/>
+          </a:p>
+        </p:txBody>
+      </p:sp>
+      <p:sp>
+        <p:nvSpPr>
+          <p:cNvPr id="58" name="PlaceHolder 2"/>
+          <p:cNvSpPr>
+            <a:spLocks noGrp="1"/>
+          </p:cNvSpPr>
+          <p:nvPr>
+            <p:ph type="body"/>
+          </p:nvPr>
+        </p:nvSpPr>
+        <p:spPr>
+          <a:xfrm>
+            <a:off x="457200" y="1604520"/>
+            <a:ext cx="8046360" cy="1896840"/>
+          </a:xfrm>
+          <a:prstGeom prst="rect">
+            <a:avLst/>
+          </a:prstGeom>
+        </p:spPr>
+        <p:txBody>
+          <a:bodyPr bIns="0" lIns="0" rIns="0" tIns="0" wrap="none"/>
+          <a:p>
+            <a:endParaRPr/>
+          </a:p>
+        </p:txBody>
+      </p:sp>
+      <p:sp>
+        <p:nvSpPr>
+          <p:cNvPr id="59" name="PlaceHolder 3"/>
+          <p:cNvSpPr>
+            <a:spLocks noGrp="1"/>
+          </p:cNvSpPr>
+          <p:nvPr>
+            <p:ph type="body"/>
+          </p:nvPr>
+        </p:nvSpPr>
+        <p:spPr>
+          <a:xfrm>
+            <a:off x="457200" y="3681720"/>
+            <a:ext cx="8046360" cy="1896840"/>
+          </a:xfrm>
+          <a:prstGeom prst="rect">
+            <a:avLst/>
+          </a:prstGeom>
+        </p:spPr>
+        <p:txBody>
+          <a:bodyPr bIns="0" lIns="0" rIns="0" tIns="0" wrap="none"/>
+          <a:p>
+            <a:endParaRPr/>
+          </a:p>
+        </p:txBody>
+      </p:sp>
+    </p:spTree>
+  </p:cSld>
+</p:sldLayout>
+</file>
+
+<file path=ppt/slideLayouts/slideLayout23.xml><?xml version="1.0" encoding="utf-8"?>
+<p:sldLayout xmlns:a="http://schemas.openxmlformats.org/drawingml/2006/main" xmlns:p="http://schemas.openxmlformats.org/presentationml/2006/main" xmlns:r="http://schemas.openxmlformats.org/officeDocument/2006/relationships" preserve="1" type="fourObj">
+  <p:cSld name="Title, 4 Content">
+    <p:spTree>
+      <p:nvGrpSpPr>
+        <p:cNvPr id="1" name=""/>
+        <p:cNvGrpSpPr/>
+        <p:nvPr/>
+      </p:nvGrpSpPr>
+      <p:grpSpPr>
+        <a:xfrm>
+          <a:off x="0" y="0"/>
+          <a:ext cx="0" cy="0"/>
+          <a:chOff x="0" y="0"/>
+          <a:chExt cx="0" cy="0"/>
+        </a:xfrm>
+      </p:grpSpPr>
+      <p:sp>
+        <p:nvSpPr>
+          <p:cNvPr id="60" name="PlaceHolder 1"/>
+          <p:cNvSpPr>
+            <a:spLocks noGrp="1"/>
+          </p:cNvSpPr>
+          <p:nvPr>
+            <p:ph type="title"/>
+          </p:nvPr>
+        </p:nvSpPr>
+        <p:spPr>
+          <a:xfrm>
+            <a:off x="457200" y="273600"/>
+            <a:ext cx="8229240" cy="1145160"/>
+          </a:xfrm>
+          <a:prstGeom prst="rect">
+            <a:avLst/>
+          </a:prstGeom>
+        </p:spPr>
+        <p:txBody>
+          <a:bodyPr anchor="ctr" bIns="0" lIns="0" rIns="0" tIns="0" wrap="none"/>
+          <a:p>
+            <a:pPr algn="ctr"/>
+            <a:endParaRPr/>
+          </a:p>
+        </p:txBody>
+      </p:sp>
+      <p:sp>
+        <p:nvSpPr>
+          <p:cNvPr id="61" name="PlaceHolder 2"/>
+          <p:cNvSpPr>
+            <a:spLocks noGrp="1"/>
+          </p:cNvSpPr>
+          <p:nvPr>
+            <p:ph type="body"/>
+          </p:nvPr>
+        </p:nvSpPr>
+        <p:spPr>
+          <a:xfrm>
+            <a:off x="457200" y="1604520"/>
+            <a:ext cx="3926160" cy="1896840"/>
+          </a:xfrm>
+          <a:prstGeom prst="rect">
+            <a:avLst/>
+          </a:prstGeom>
+        </p:spPr>
+        <p:txBody>
+          <a:bodyPr bIns="0" lIns="0" rIns="0" tIns="0" wrap="none"/>
+          <a:p>
+            <a:endParaRPr/>
+          </a:p>
+        </p:txBody>
+      </p:sp>
+      <p:sp>
+        <p:nvSpPr>
+          <p:cNvPr id="62" name="PlaceHolder 3"/>
+          <p:cNvSpPr>
+            <a:spLocks noGrp="1"/>
+          </p:cNvSpPr>
+          <p:nvPr>
+            <p:ph type="body"/>
+          </p:nvPr>
+        </p:nvSpPr>
+        <p:spPr>
+          <a:xfrm>
+            <a:off x="4579920" y="1604520"/>
+            <a:ext cx="3926160" cy="1896840"/>
+          </a:xfrm>
+          <a:prstGeom prst="rect">
+            <a:avLst/>
+          </a:prstGeom>
+        </p:spPr>
+        <p:txBody>
+          <a:bodyPr bIns="0" lIns="0" rIns="0" tIns="0" wrap="none"/>
+          <a:p>
+            <a:endParaRPr/>
+          </a:p>
+        </p:txBody>
+      </p:sp>
+      <p:sp>
+        <p:nvSpPr>
+          <p:cNvPr id="63" name="PlaceHolder 4"/>
+          <p:cNvSpPr>
+            <a:spLocks noGrp="1"/>
+          </p:cNvSpPr>
+          <p:nvPr>
+            <p:ph type="body"/>
+          </p:nvPr>
+        </p:nvSpPr>
+        <p:spPr>
+          <a:xfrm>
+            <a:off x="4579920" y="3681720"/>
+            <a:ext cx="3926160" cy="1896840"/>
+          </a:xfrm>
+          <a:prstGeom prst="rect">
+            <a:avLst/>
+          </a:prstGeom>
+        </p:spPr>
+        <p:txBody>
+          <a:bodyPr bIns="0" lIns="0" rIns="0" tIns="0" wrap="none"/>
+          <a:p>
+            <a:endParaRPr/>
+          </a:p>
+        </p:txBody>
+      </p:sp>
+      <p:sp>
+        <p:nvSpPr>
+          <p:cNvPr id="64" name="PlaceHolder 5"/>
+          <p:cNvSpPr>
+            <a:spLocks noGrp="1"/>
+          </p:cNvSpPr>
+          <p:nvPr>
+            <p:ph type="body"/>
+          </p:nvPr>
+        </p:nvSpPr>
+        <p:spPr>
+          <a:xfrm>
+            <a:off x="457200" y="3681720"/>
+            <a:ext cx="3926160" cy="1896840"/>
+          </a:xfrm>
+          <a:prstGeom prst="rect">
+            <a:avLst/>
+          </a:prstGeom>
+        </p:spPr>
+        <p:txBody>
+          <a:bodyPr bIns="0" lIns="0" rIns="0" tIns="0" wrap="none"/>
+          <a:p>
+            <a:endParaRPr/>
+          </a:p>
+        </p:txBody>
+      </p:sp>
+    </p:spTree>
+  </p:cSld>
+</p:sldLayout>
+</file>
+
+<file path=ppt/slideLayouts/slideLayout24.xml><?xml version="1.0" encoding="utf-8"?>
+<p:sldLayout xmlns:a="http://schemas.openxmlformats.org/drawingml/2006/main" xmlns:p="http://schemas.openxmlformats.org/presentationml/2006/main" xmlns:r="http://schemas.openxmlformats.org/officeDocument/2006/relationships" preserve="1" type="blank">
+  <p:cSld name="Title, 6 Content">
+    <p:spTree>
+      <p:nvGrpSpPr>
+        <p:cNvPr id="1" name=""/>
+        <p:cNvGrpSpPr/>
+        <p:nvPr/>
+      </p:nvGrpSpPr>
+      <p:grpSpPr>
+        <a:xfrm>
+          <a:off x="0" y="0"/>
+          <a:ext cx="0" cy="0"/>
+          <a:chOff x="0" y="0"/>
+          <a:chExt cx="0" cy="0"/>
+        </a:xfrm>
+      </p:grpSpPr>
+      <p:sp>
+        <p:nvSpPr>
+          <p:cNvPr id="65" name="PlaceHolder 1"/>
+          <p:cNvSpPr>
+            <a:spLocks noGrp="1"/>
+          </p:cNvSpPr>
+          <p:nvPr>
+            <p:ph type="title"/>
+          </p:nvPr>
+        </p:nvSpPr>
+        <p:spPr>
+          <a:xfrm>
+            <a:off x="457200" y="273600"/>
+            <a:ext cx="8229240" cy="1145160"/>
+          </a:xfrm>
+          <a:prstGeom prst="rect">
+            <a:avLst/>
+          </a:prstGeom>
+        </p:spPr>
+        <p:txBody>
+          <a:bodyPr anchor="ctr" bIns="0" lIns="0" rIns="0" tIns="0" wrap="none"/>
+          <a:p>
+            <a:pPr algn="ctr"/>
+            <a:endParaRPr/>
+          </a:p>
+        </p:txBody>
+      </p:sp>
+      <p:sp>
+        <p:nvSpPr>
+          <p:cNvPr id="66" name="PlaceHolder 2"/>
+          <p:cNvSpPr>
+            <a:spLocks noGrp="1"/>
+          </p:cNvSpPr>
+          <p:nvPr>
+            <p:ph type="body"/>
+          </p:nvPr>
+        </p:nvSpPr>
+        <p:spPr>
+          <a:xfrm>
+            <a:off x="457200" y="1604520"/>
+            <a:ext cx="3926160" cy="1896840"/>
+          </a:xfrm>
+          <a:prstGeom prst="rect">
+            <a:avLst/>
+          </a:prstGeom>
+        </p:spPr>
+        <p:txBody>
+          <a:bodyPr bIns="0" lIns="0" rIns="0" tIns="0" wrap="none"/>
+          <a:p>
+            <a:endParaRPr/>
+          </a:p>
+        </p:txBody>
+      </p:sp>
+      <p:sp>
+        <p:nvSpPr>
+          <p:cNvPr id="67" name="PlaceHolder 3"/>
+          <p:cNvSpPr>
+            <a:spLocks noGrp="1"/>
+          </p:cNvSpPr>
+          <p:nvPr>
+            <p:ph type="body"/>
+          </p:nvPr>
+        </p:nvSpPr>
+        <p:spPr>
+          <a:xfrm>
+            <a:off x="4579920" y="1604520"/>
+            <a:ext cx="3926160" cy="1896840"/>
+          </a:xfrm>
+          <a:prstGeom prst="rect">
+            <a:avLst/>
+          </a:prstGeom>
+        </p:spPr>
+        <p:txBody>
+          <a:bodyPr bIns="0" lIns="0" rIns="0" tIns="0" wrap="none"/>
+          <a:p>
+            <a:endParaRPr/>
+          </a:p>
+        </p:txBody>
+      </p:sp>
+    </p:spTree>
+  </p:cSld>
+</p:sldLayout>
+</file>
+
+<file path=ppt/slideLayouts/slideLayout3.xml><?xml version="1.0" encoding="utf-8"?>
+<p:sldLayout xmlns:a="http://schemas.openxmlformats.org/drawingml/2006/main" xmlns:p="http://schemas.openxmlformats.org/presentationml/2006/main" xmlns:r="http://schemas.openxmlformats.org/officeDocument/2006/relationships" preserve="1" type="obj">
+  <p:cSld name="Title, Content">
+    <p:spTree>
+      <p:nvGrpSpPr>
+        <p:cNvPr id="1" name=""/>
+        <p:cNvGrpSpPr/>
+        <p:nvPr/>
+      </p:nvGrpSpPr>
+      <p:grpSpPr>
+        <a:xfrm>
+          <a:off x="0" y="0"/>
+          <a:ext cx="0" cy="0"/>
+          <a:chOff x="0" y="0"/>
+          <a:chExt cx="0" cy="0"/>
+        </a:xfrm>
+      </p:grpSpPr>
+      <p:sp>
+        <p:nvSpPr>
+          <p:cNvPr id="4" name="PlaceHolder 1"/>
+          <p:cNvSpPr>
+            <a:spLocks noGrp="1"/>
+          </p:cNvSpPr>
+          <p:nvPr>
+            <p:ph type="title"/>
+          </p:nvPr>
+        </p:nvSpPr>
+        <p:spPr>
+          <a:xfrm>
+            <a:off x="457200" y="273600"/>
+            <a:ext cx="8229240" cy="1145160"/>
+          </a:xfrm>
+          <a:prstGeom prst="rect">
+            <a:avLst/>
+          </a:prstGeom>
+        </p:spPr>
+        <p:txBody>
+          <a:bodyPr anchor="ctr" bIns="0" lIns="0" rIns="0" tIns="0" wrap="none"/>
+          <a:p>
+            <a:pPr algn="ctr"/>
+            <a:endParaRPr/>
+          </a:p>
+        </p:txBody>
+      </p:sp>
+      <p:sp>
+        <p:nvSpPr>
+          <p:cNvPr id="5" name="PlaceHolder 2"/>
+          <p:cNvSpPr>
+            <a:spLocks noGrp="1"/>
+          </p:cNvSpPr>
+          <p:nvPr>
+            <p:ph type="body"/>
+          </p:nvPr>
+        </p:nvSpPr>
+        <p:spPr>
+          <a:xfrm>
+            <a:off x="457200" y="1604520"/>
+            <a:ext cx="8046360" cy="3977280"/>
+          </a:xfrm>
+          <a:prstGeom prst="rect">
+            <a:avLst/>
+          </a:prstGeom>
+        </p:spPr>
+        <p:txBody>
+          <a:bodyPr bIns="0" lIns="0" rIns="0" tIns="0" wrap="none"/>
+          <a:p>
+            <a:endParaRPr/>
+          </a:p>
+        </p:txBody>
+      </p:sp>
+    </p:spTree>
+  </p:cSld>
+</p:sldLayout>
+</file>
+
+<file path=ppt/slideLayouts/slideLayout4.xml><?xml version="1.0" encoding="utf-8"?>
+<p:sldLayout xmlns:a="http://schemas.openxmlformats.org/drawingml/2006/main" xmlns:p="http://schemas.openxmlformats.org/presentationml/2006/main" xmlns:r="http://schemas.openxmlformats.org/officeDocument/2006/relationships" preserve="1" type="twoObj">
+  <p:cSld name="Title, 2 Content">
+    <p:spTree>
+      <p:nvGrpSpPr>
+        <p:cNvPr id="1" name=""/>
+        <p:cNvGrpSpPr/>
+        <p:nvPr/>
+      </p:nvGrpSpPr>
+      <p:grpSpPr>
+        <a:xfrm>
+          <a:off x="0" y="0"/>
+          <a:ext cx="0" cy="0"/>
+          <a:chOff x="0" y="0"/>
+          <a:chExt cx="0" cy="0"/>
+        </a:xfrm>
+      </p:grpSpPr>
+      <p:sp>
+        <p:nvSpPr>
+          <p:cNvPr id="6" name="PlaceHolder 1"/>
+          <p:cNvSpPr>
+            <a:spLocks noGrp="1"/>
+          </p:cNvSpPr>
+          <p:nvPr>
+            <p:ph type="title"/>
+          </p:nvPr>
+        </p:nvSpPr>
+        <p:spPr>
+          <a:xfrm>
+            <a:off x="457200" y="273600"/>
+            <a:ext cx="8229240" cy="1145160"/>
+          </a:xfrm>
+          <a:prstGeom prst="rect">
+            <a:avLst/>
+          </a:prstGeom>
+        </p:spPr>
+        <p:txBody>
+          <a:bodyPr anchor="ctr" bIns="0" lIns="0" rIns="0" tIns="0" wrap="none"/>
+          <a:p>
+            <a:pPr algn="ctr"/>
+            <a:endParaRPr/>
+          </a:p>
+        </p:txBody>
+      </p:sp>
+      <p:sp>
+        <p:nvSpPr>
+          <p:cNvPr id="7" name="PlaceHolder 2"/>
+          <p:cNvSpPr>
+            <a:spLocks noGrp="1"/>
+          </p:cNvSpPr>
+          <p:nvPr>
+            <p:ph type="body"/>
+          </p:nvPr>
+        </p:nvSpPr>
+        <p:spPr>
+          <a:xfrm>
+            <a:off x="457200" y="1604520"/>
+            <a:ext cx="3926160" cy="3977280"/>
+          </a:xfrm>
+          <a:prstGeom prst="rect">
+            <a:avLst/>
+          </a:prstGeom>
+        </p:spPr>
+        <p:txBody>
+          <a:bodyPr bIns="0" lIns="0" rIns="0" tIns="0" wrap="none"/>
+          <a:p>
+            <a:endParaRPr/>
+          </a:p>
+        </p:txBody>
+      </p:sp>
+      <p:sp>
+        <p:nvSpPr>
+          <p:cNvPr id="8" name="PlaceHolder 3"/>
+          <p:cNvSpPr>
+            <a:spLocks noGrp="1"/>
+          </p:cNvSpPr>
+          <p:nvPr>
+            <p:ph type="body"/>
+          </p:nvPr>
+        </p:nvSpPr>
+        <p:spPr>
+          <a:xfrm>
+            <a:off x="4579920" y="1604520"/>
+            <a:ext cx="3926160" cy="3977280"/>
+          </a:xfrm>
+          <a:prstGeom prst="rect">
+            <a:avLst/>
+          </a:prstGeom>
+        </p:spPr>
+        <p:txBody>
+          <a:bodyPr bIns="0" lIns="0" rIns="0" tIns="0" wrap="none"/>
+          <a:p>
+            <a:endParaRPr/>
+          </a:p>
+        </p:txBody>
+      </p:sp>
+    </p:spTree>
+  </p:cSld>
+</p:sldLayout>
+</file>
+
+<file path=ppt/slideLayouts/slideLayout5.xml><?xml version="1.0" encoding="utf-8"?>
+<p:sldLayout xmlns:a="http://schemas.openxmlformats.org/drawingml/2006/main" xmlns:p="http://schemas.openxmlformats.org/presentationml/2006/main" xmlns:r="http://schemas.openxmlformats.org/officeDocument/2006/relationships" preserve="1" type="titleOnly">
+  <p:cSld name="Title Only">
+    <p:spTree>
+      <p:nvGrpSpPr>
+        <p:cNvPr id="1" name=""/>
+        <p:cNvGrpSpPr/>
+        <p:nvPr/>
+      </p:nvGrpSpPr>
+      <p:grpSpPr>
+        <a:xfrm>
+          <a:off x="0" y="0"/>
+          <a:ext cx="0" cy="0"/>
+          <a:chOff x="0" y="0"/>
+          <a:chExt cx="0" cy="0"/>
+        </a:xfrm>
+      </p:grpSpPr>
+      <p:sp>
+        <p:nvSpPr>
+          <p:cNvPr id="9" name="PlaceHolder 1"/>
+          <p:cNvSpPr>
+            <a:spLocks noGrp="1"/>
+          </p:cNvSpPr>
+          <p:nvPr>
+            <p:ph type="title"/>
+          </p:nvPr>
+        </p:nvSpPr>
+        <p:spPr>
+          <a:xfrm>
+            <a:off x="457200" y="273600"/>
+            <a:ext cx="8229240" cy="1145160"/>
+          </a:xfrm>
+          <a:prstGeom prst="rect">
+            <a:avLst/>
+          </a:prstGeom>
+        </p:spPr>
+        <p:txBody>
+          <a:bodyPr anchor="ctr" bIns="0" lIns="0" rIns="0" tIns="0" wrap="none"/>
+          <a:p>
+            <a:pPr algn="ctr"/>
+            <a:endParaRPr/>
+          </a:p>
+        </p:txBody>
+      </p:sp>
+    </p:spTree>
+  </p:cSld>
+</p:sldLayout>
+</file>
+
+<file path=ppt/slideLayouts/slideLayout6.xml><?xml version="1.0" encoding="utf-8"?>
+<p:sldLayout xmlns:a="http://schemas.openxmlformats.org/drawingml/2006/main" xmlns:p="http://schemas.openxmlformats.org/presentationml/2006/main" xmlns:r="http://schemas.openxmlformats.org/officeDocument/2006/relationships" preserve="1" type="objOnly">
+  <p:cSld name="Centered Text">
+    <p:spTree>
+      <p:nvGrpSpPr>
+        <p:cNvPr id="1" name=""/>
+        <p:cNvGrpSpPr/>
+        <p:nvPr/>
+      </p:nvGrpSpPr>
+      <p:grpSpPr>
+        <a:xfrm>
+          <a:off x="0" y="0"/>
+          <a:ext cx="0" cy="0"/>
+          <a:chOff x="0" y="0"/>
+          <a:chExt cx="0" cy="0"/>
+        </a:xfrm>
+      </p:grpSpPr>
+      <p:sp>
+        <p:nvSpPr>
+          <p:cNvPr id="10" name="PlaceHolder 1"/>
+          <p:cNvSpPr>
+            <a:spLocks noGrp="1"/>
+          </p:cNvSpPr>
+          <p:nvPr>
+            <p:ph type="subTitle"/>
+          </p:nvPr>
+        </p:nvSpPr>
+        <p:spPr>
+          <a:xfrm>
+            <a:off x="457200" y="273600"/>
+            <a:ext cx="8229240" cy="5308200"/>
+          </a:xfrm>
+          <a:prstGeom prst="rect">
+            <a:avLst/>
+          </a:prstGeom>
+        </p:spPr>
+        <p:txBody>
+          <a:bodyPr anchor="ctr" bIns="0" lIns="0" rIns="0" tIns="0" wrap="none"/>
+          <a:p>
+            <a:pPr algn="ctr"/>
+            <a:endParaRPr/>
+          </a:p>
+        </p:txBody>
+      </p:sp>
+    </p:spTree>
+  </p:cSld>
+</p:sldLayout>
+</file>
+
+<file path=ppt/slideLayouts/slideLayout7.xml><?xml version="1.0" encoding="utf-8"?>
+<p:sldLayout xmlns:a="http://schemas.openxmlformats.org/drawingml/2006/main" xmlns:p="http://schemas.openxmlformats.org/presentationml/2006/main" xmlns:r="http://schemas.openxmlformats.org/officeDocument/2006/relationships" preserve="1" type="twoObjAndObj">
+  <p:cSld name="Title, 2 Content and Content">
+    <p:spTree>
+      <p:nvGrpSpPr>
+        <p:cNvPr id="1" name=""/>
+        <p:cNvGrpSpPr/>
+        <p:nvPr/>
+      </p:nvGrpSpPr>
+      <p:grpSpPr>
+        <a:xfrm>
+          <a:off x="0" y="0"/>
+          <a:ext cx="0" cy="0"/>
+          <a:chOff x="0" y="0"/>
+          <a:chExt cx="0" cy="0"/>
+        </a:xfrm>
+      </p:grpSpPr>
+      <p:sp>
+        <p:nvSpPr>
+          <p:cNvPr id="11" name="PlaceHolder 1"/>
+          <p:cNvSpPr>
+            <a:spLocks noGrp="1"/>
+          </p:cNvSpPr>
+          <p:nvPr>
+            <p:ph type="title"/>
+          </p:nvPr>
+        </p:nvSpPr>
+        <p:spPr>
+          <a:xfrm>
+            <a:off x="457200" y="273600"/>
+            <a:ext cx="8229240" cy="1145160"/>
+          </a:xfrm>
+          <a:prstGeom prst="rect">
+            <a:avLst/>
+          </a:prstGeom>
+        </p:spPr>
+        <p:txBody>
+          <a:bodyPr anchor="ctr" bIns="0" lIns="0" rIns="0" tIns="0" wrap="none"/>
+          <a:p>
+            <a:pPr algn="ctr"/>
+            <a:endParaRPr/>
+          </a:p>
+        </p:txBody>
+      </p:sp>
+      <p:sp>
+        <p:nvSpPr>
+          <p:cNvPr id="12" name="PlaceHolder 2"/>
+          <p:cNvSpPr>
+            <a:spLocks noGrp="1"/>
+          </p:cNvSpPr>
+          <p:nvPr>
+            <p:ph type="body"/>
+          </p:nvPr>
+        </p:nvSpPr>
+        <p:spPr>
+          <a:xfrm>
+            <a:off x="457200" y="1604520"/>
+            <a:ext cx="3926160" cy="1896840"/>
+          </a:xfrm>
+          <a:prstGeom prst="rect">
+            <a:avLst/>
+          </a:prstGeom>
+        </p:spPr>
+        <p:txBody>
+          <a:bodyPr bIns="0" lIns="0" rIns="0" tIns="0" wrap="none"/>
+          <a:p>
+            <a:endParaRPr/>
+          </a:p>
+        </p:txBody>
+      </p:sp>
+      <p:sp>
+        <p:nvSpPr>
+          <p:cNvPr id="13" name="PlaceHolder 3"/>
+          <p:cNvSpPr>
+            <a:spLocks noGrp="1"/>
+          </p:cNvSpPr>
+          <p:nvPr>
+            <p:ph type="body"/>
+          </p:nvPr>
+        </p:nvSpPr>
+        <p:spPr>
+          <a:xfrm>
+            <a:off x="457200" y="3681720"/>
+            <a:ext cx="3926160" cy="1896840"/>
+          </a:xfrm>
+          <a:prstGeom prst="rect">
+            <a:avLst/>
+          </a:prstGeom>
+        </p:spPr>
+        <p:txBody>
+          <a:bodyPr bIns="0" lIns="0" rIns="0" tIns="0" wrap="none"/>
+          <a:p>
+            <a:endParaRPr/>
+          </a:p>
+        </p:txBody>
+      </p:sp>
+      <p:sp>
+        <p:nvSpPr>
+          <p:cNvPr id="14" name="PlaceHolder 4"/>
+          <p:cNvSpPr>
+            <a:spLocks noGrp="1"/>
+          </p:cNvSpPr>
+          <p:nvPr>
+            <p:ph type="body"/>
+          </p:nvPr>
+        </p:nvSpPr>
+        <p:spPr>
+          <a:xfrm>
+            <a:off x="4579920" y="1604520"/>
+            <a:ext cx="3926160" cy="3977280"/>
+          </a:xfrm>
+          <a:prstGeom prst="rect">
+            <a:avLst/>
+          </a:prstGeom>
+        </p:spPr>
+        <p:txBody>
+          <a:bodyPr bIns="0" lIns="0" rIns="0" tIns="0" wrap="none"/>
+          <a:p>
+            <a:endParaRPr/>
+          </a:p>
+        </p:txBody>
+      </p:sp>
+    </p:spTree>
+  </p:cSld>
+</p:sldLayout>
+</file>
+
+<file path=ppt/slideLayouts/slideLayout8.xml><?xml version="1.0" encoding="utf-8"?>
+<p:sldLayout xmlns:a="http://schemas.openxmlformats.org/drawingml/2006/main" xmlns:p="http://schemas.openxmlformats.org/presentationml/2006/main" xmlns:r="http://schemas.openxmlformats.org/officeDocument/2006/relationships" preserve="1" type="objAndTwoObj">
+  <p:cSld name="Title Content and 2 Content">
+    <p:spTree>
+      <p:nvGrpSpPr>
+        <p:cNvPr id="1" name=""/>
+        <p:cNvGrpSpPr/>
+        <p:nvPr/>
+      </p:nvGrpSpPr>
+      <p:grpSpPr>
+        <a:xfrm>
+          <a:off x="0" y="0"/>
+          <a:ext cx="0" cy="0"/>
+          <a:chOff x="0" y="0"/>
+          <a:chExt cx="0" cy="0"/>
+        </a:xfrm>
+      </p:grpSpPr>
+      <p:sp>
+        <p:nvSpPr>
+          <p:cNvPr id="15" name="PlaceHolder 1"/>
+          <p:cNvSpPr>
+            <a:spLocks noGrp="1"/>
+          </p:cNvSpPr>
+          <p:nvPr>
+            <p:ph type="title"/>
+          </p:nvPr>
+        </p:nvSpPr>
+        <p:spPr>
+          <a:xfrm>
+            <a:off x="457200" y="273600"/>
+            <a:ext cx="8229240" cy="1145160"/>
+          </a:xfrm>
+          <a:prstGeom prst="rect">
+            <a:avLst/>
+          </a:prstGeom>
+        </p:spPr>
+        <p:txBody>
+          <a:bodyPr anchor="ctr" bIns="0" lIns="0" rIns="0" tIns="0" wrap="none"/>
+          <a:p>
+            <a:pPr algn="ctr"/>
+            <a:endParaRPr/>
+          </a:p>
+        </p:txBody>
+      </p:sp>
+      <p:sp>
+        <p:nvSpPr>
+          <p:cNvPr id="16" name="PlaceHolder 2"/>
+          <p:cNvSpPr>
+            <a:spLocks noGrp="1"/>
+          </p:cNvSpPr>
+          <p:nvPr>
+            <p:ph type="body"/>
+          </p:nvPr>
+        </p:nvSpPr>
+        <p:spPr>
+          <a:xfrm>
+            <a:off x="457200" y="1604520"/>
+            <a:ext cx="3926160" cy="3977280"/>
+          </a:xfrm>
+          <a:prstGeom prst="rect">
+            <a:avLst/>
+          </a:prstGeom>
+        </p:spPr>
+        <p:txBody>
+          <a:bodyPr bIns="0" lIns="0" rIns="0" tIns="0" wrap="none"/>
+          <a:p>
+            <a:endParaRPr/>
+          </a:p>
+        </p:txBody>
+      </p:sp>
+      <p:sp>
+        <p:nvSpPr>
+          <p:cNvPr id="17" name="PlaceHolder 3"/>
+          <p:cNvSpPr>
+            <a:spLocks noGrp="1"/>
+          </p:cNvSpPr>
+          <p:nvPr>
+            <p:ph type="body"/>
+          </p:nvPr>
+        </p:nvSpPr>
+        <p:spPr>
+          <a:xfrm>
+            <a:off x="4579920" y="1604520"/>
+            <a:ext cx="3926160" cy="1896840"/>
+          </a:xfrm>
+          <a:prstGeom prst="rect">
+            <a:avLst/>
+          </a:prstGeom>
+        </p:spPr>
+        <p:txBody>
+          <a:bodyPr bIns="0" lIns="0" rIns="0" tIns="0" wrap="none"/>
+          <a:p>
+            <a:endParaRPr/>
+          </a:p>
+        </p:txBody>
+      </p:sp>
+      <p:sp>
+        <p:nvSpPr>
+          <p:cNvPr id="18" name="PlaceHolder 4"/>
+          <p:cNvSpPr>
+            <a:spLocks noGrp="1"/>
+          </p:cNvSpPr>
+          <p:nvPr>
+            <p:ph type="body"/>
+          </p:nvPr>
+        </p:nvSpPr>
+        <p:spPr>
+          <a:xfrm>
+            <a:off x="4579920" y="3681720"/>
+            <a:ext cx="3926160" cy="1896840"/>
+          </a:xfrm>
+          <a:prstGeom prst="rect">
+            <a:avLst/>
+          </a:prstGeom>
+        </p:spPr>
+        <p:txBody>
+          <a:bodyPr bIns="0" lIns="0" rIns="0" tIns="0" wrap="none"/>
+          <a:p>
+            <a:endParaRPr/>
+          </a:p>
+        </p:txBody>
+      </p:sp>
+    </p:spTree>
+  </p:cSld>
+</p:sldLayout>
+</file>
+
+<file path=ppt/slideLayouts/slideLayout9.xml><?xml version="1.0" encoding="utf-8"?>
+<p:sldLayout xmlns:a="http://schemas.openxmlformats.org/drawingml/2006/main" xmlns:p="http://schemas.openxmlformats.org/presentationml/2006/main" xmlns:r="http://schemas.openxmlformats.org/officeDocument/2006/relationships" preserve="1" type="twoObjOverTx">
+  <p:cSld name="Title, 2 Content over Content">
+    <p:spTree>
+      <p:nvGrpSpPr>
+        <p:cNvPr id="1" name=""/>
+        <p:cNvGrpSpPr/>
+        <p:nvPr/>
+      </p:nvGrpSpPr>
+      <p:grpSpPr>
+        <a:xfrm>
+          <a:off x="0" y="0"/>
+          <a:ext cx="0" cy="0"/>
+          <a:chOff x="0" y="0"/>
+          <a:chExt cx="0" cy="0"/>
+        </a:xfrm>
+      </p:grpSpPr>
+      <p:sp>
+        <p:nvSpPr>
+          <p:cNvPr id="19" name="PlaceHolder 1"/>
+          <p:cNvSpPr>
+            <a:spLocks noGrp="1"/>
+          </p:cNvSpPr>
+          <p:nvPr>
+            <p:ph type="title"/>
+          </p:nvPr>
+        </p:nvSpPr>
+        <p:spPr>
+          <a:xfrm>
+            <a:off x="457200" y="273600"/>
+            <a:ext cx="8229240" cy="1145160"/>
+          </a:xfrm>
+          <a:prstGeom prst="rect">
+            <a:avLst/>
+          </a:prstGeom>
+        </p:spPr>
+        <p:txBody>
+          <a:bodyPr anchor="ctr" bIns="0" lIns="0" rIns="0" tIns="0" wrap="none"/>
+          <a:p>
+            <a:pPr algn="ctr"/>
+            <a:endParaRPr/>
+          </a:p>
+        </p:txBody>
+      </p:sp>
+      <p:sp>
+        <p:nvSpPr>
+          <p:cNvPr id="20" name="PlaceHolder 2"/>
+          <p:cNvSpPr>
+            <a:spLocks noGrp="1"/>
+          </p:cNvSpPr>
+          <p:nvPr>
+            <p:ph type="body"/>
+          </p:nvPr>
+        </p:nvSpPr>
+        <p:spPr>
+          <a:xfrm>
+            <a:off x="457200" y="1604520"/>
+            <a:ext cx="3926160" cy="1896840"/>
+          </a:xfrm>
+          <a:prstGeom prst="rect">
+            <a:avLst/>
+          </a:prstGeom>
+        </p:spPr>
+        <p:txBody>
+          <a:bodyPr bIns="0" lIns="0" rIns="0" tIns="0" wrap="none"/>
+          <a:p>
+            <a:endParaRPr/>
+          </a:p>
+        </p:txBody>
+      </p:sp>
+      <p:sp>
+        <p:nvSpPr>
+          <p:cNvPr id="21" name="PlaceHolder 3"/>
+          <p:cNvSpPr>
+            <a:spLocks noGrp="1"/>
+          </p:cNvSpPr>
+          <p:nvPr>
+            <p:ph type="body"/>
+          </p:nvPr>
+        </p:nvSpPr>
+        <p:spPr>
+          <a:xfrm>
+            <a:off x="4579920" y="1604520"/>
+            <a:ext cx="3926160" cy="1896840"/>
+          </a:xfrm>
+          <a:prstGeom prst="rect">
+            <a:avLst/>
+          </a:prstGeom>
+        </p:spPr>
+        <p:txBody>
+          <a:bodyPr bIns="0" lIns="0" rIns="0" tIns="0" wrap="none"/>
+          <a:p>
+            <a:endParaRPr/>
+          </a:p>
+        </p:txBody>
+      </p:sp>
+      <p:sp>
+        <p:nvSpPr>
+          <p:cNvPr id="22" name="PlaceHolder 4"/>
+          <p:cNvSpPr>
+            <a:spLocks noGrp="1"/>
+          </p:cNvSpPr>
+          <p:nvPr>
+            <p:ph type="body"/>
+          </p:nvPr>
+        </p:nvSpPr>
+        <p:spPr>
+          <a:xfrm>
+            <a:off x="457200" y="3681720"/>
+            <a:ext cx="8045640" cy="1896840"/>
+          </a:xfrm>
+          <a:prstGeom prst="rect">
+            <a:avLst/>
+          </a:prstGeom>
+        </p:spPr>
+        <p:txBody>
+          <a:bodyPr bIns="0" lIns="0" rIns="0" tIns="0" wrap="none"/>
+          <a:p>
+            <a:endParaRPr/>
+          </a:p>
+        </p:txBody>
+      </p:sp>
     </p:spTree>
   </p:cSld>
 </p:sldLayout>
@@ -97,8 +2269,8 @@
         </p:nvSpPr>
         <p:spPr>
           <a:xfrm>
-            <a:off x="457200" y="274680"/>
-            <a:ext cx="8228880" cy="1142640"/>
+            <a:off x="457200" y="273600"/>
+            <a:ext cx="8229240" cy="1144800"/>
           </a:xfrm>
           <a:prstGeom prst="rect">
             <a:avLst/>
@@ -107,6 +2279,7 @@
         <p:txBody>
           <a:bodyPr anchor="ctr" bIns="0" lIns="0" rIns="0" tIns="0" wrap="none"/>
           <a:p>
+            <a:pPr algn="ctr"/>
             <a:r>
               <a:rPr lang="pt-BR"/>
               <a:t>Clique para editar o formato do texto do título</a:t>
@@ -128,7 +2301,7 @@
         <p:spPr>
           <a:xfrm>
             <a:off x="457200" y="1604520"/>
-            <a:ext cx="8229240" cy="4525920"/>
+            <a:ext cx="8046360" cy="3977280"/>
           </a:xfrm>
           <a:prstGeom prst="rect">
             <a:avLst/>
@@ -150,45 +2323,45 @@
           </a:p>
           <a:p>
             <a:pPr lvl="1">
+              <a:buSzPct val="75000"/>
+              <a:buFont typeface="StarSymbol"/>
+              <a:buChar char=""/>
+            </a:pPr>
+            <a:r>
+              <a:rPr lang="pt-BR"/>
+              <a:t>2.º Nível da estrutura de tópicos</a:t>
+            </a:r>
+            <a:endParaRPr/>
+          </a:p>
+          <a:p>
+            <a:pPr lvl="2">
               <a:buSzPct val="45000"/>
               <a:buFont typeface="StarSymbol"/>
               <a:buChar char=""/>
             </a:pPr>
             <a:r>
               <a:rPr lang="pt-BR"/>
-              <a:t>2.º Nível da estrutura de tópicos</a:t>
+              <a:t>3.º Nível da estrutura de tópicos</a:t>
             </a:r>
             <a:endParaRPr/>
           </a:p>
           <a:p>
-            <a:pPr lvl="2">
+            <a:pPr lvl="3">
               <a:buSzPct val="75000"/>
               <a:buFont typeface="StarSymbol"/>
               <a:buChar char=""/>
             </a:pPr>
             <a:r>
               <a:rPr lang="pt-BR"/>
-              <a:t>3.º Nível da estrutura de tópicos</a:t>
+              <a:t>4.º Nível da estrutura de tópicos</a:t>
             </a:r>
             <a:endParaRPr/>
           </a:p>
           <a:p>
-            <a:pPr lvl="3">
+            <a:pPr lvl="4">
               <a:buSzPct val="45000"/>
               <a:buFont typeface="StarSymbol"/>
               <a:buChar char=""/>
-            </a:pPr>
-            <a:r>
-              <a:rPr lang="pt-BR"/>
-              <a:t>4.º Nível da estrutura de tópicos</a:t>
-            </a:r>
-            <a:endParaRPr/>
-          </a:p>
-          <a:p>
-            <a:pPr lvl="4">
-              <a:buSzPct val="75000"/>
-              <a:buFont typeface="StarSymbol"/>
-              <a:buChar char=""/>
             </a:pPr>
             <a:r>
               <a:rPr lang="pt-BR"/>
@@ -220,30 +2393,6 @@
             </a:r>
             <a:endParaRPr/>
           </a:p>
-          <a:p>
-            <a:pPr lvl="7">
-              <a:buSzPct val="45000"/>
-              <a:buFont typeface="StarSymbol"/>
-              <a:buChar char=""/>
-            </a:pPr>
-            <a:r>
-              <a:rPr lang="pt-BR"/>
-              <a:t>8.º Nível da estrutura de tópicos</a:t>
-            </a:r>
-            <a:endParaRPr/>
-          </a:p>
-          <a:p>
-            <a:pPr lvl="8">
-              <a:buSzPct val="45000"/>
-              <a:buFont typeface="StarSymbol"/>
-              <a:buChar char=""/>
-            </a:pPr>
-            <a:r>
-              <a:rPr lang="pt-BR"/>
-              <a:t>9.º Nível da estrutura de tópicos</a:t>
-            </a:r>
-            <a:endParaRPr/>
-          </a:p>
         </p:txBody>
       </p:sp>
     </p:spTree>
@@ -251,6 +2400,17 @@
   <p:clrMap accent1="accent1" accent2="accent2" accent3="accent3" accent4="accent4" accent5="accent5" accent6="accent6" bg1="lt1" bg2="lt2" folHlink="folHlink" hlink="hlink" tx1="dk1" tx2="dk2"/>
   <p:sldLayoutIdLst>
     <p:sldLayoutId id="2147483649" r:id="rId2"/>
+    <p:sldLayoutId id="2147483650" r:id="rId3"/>
+    <p:sldLayoutId id="2147483651" r:id="rId4"/>
+    <p:sldLayoutId id="2147483652" r:id="rId5"/>
+    <p:sldLayoutId id="2147483653" r:id="rId6"/>
+    <p:sldLayoutId id="2147483654" r:id="rId7"/>
+    <p:sldLayoutId id="2147483655" r:id="rId8"/>
+    <p:sldLayoutId id="2147483656" r:id="rId9"/>
+    <p:sldLayoutId id="2147483657" r:id="rId10"/>
+    <p:sldLayoutId id="2147483658" r:id="rId11"/>
+    <p:sldLayoutId id="2147483659" r:id="rId12"/>
+    <p:sldLayoutId id="2147483660" r:id="rId13"/>
   </p:sldLayoutIdLst>
 </p:sldMaster>
 </file>
@@ -281,7 +2441,7 @@
       </p:grpSpPr>
       <p:sp>
         <p:nvSpPr>
-          <p:cNvPr id="2" name="PlaceHolder 1"/>
+          <p:cNvPr id="34" name="PlaceHolder 1"/>
           <p:cNvSpPr>
             <a:spLocks noGrp="1"/>
           </p:cNvSpPr>
@@ -312,7 +2472,7 @@
       </p:sp>
       <p:sp>
         <p:nvSpPr>
-          <p:cNvPr id="3" name="PlaceHolder 2"/>
+          <p:cNvPr id="35" name="PlaceHolder 2"/>
           <p:cNvSpPr>
             <a:spLocks noGrp="1"/>
           </p:cNvSpPr>
@@ -323,7 +2483,7 @@
         <p:spPr>
           <a:xfrm>
             <a:off x="457200" y="1604520"/>
-            <a:ext cx="8229240" cy="4525920"/>
+            <a:ext cx="8046360" cy="3977280"/>
           </a:xfrm>
           <a:prstGeom prst="rect">
             <a:avLst/>
@@ -345,45 +2505,45 @@
           </a:p>
           <a:p>
             <a:pPr lvl="1">
+              <a:buSzPct val="75000"/>
+              <a:buFont typeface="StarSymbol"/>
+              <a:buChar char=""/>
+            </a:pPr>
+            <a:r>
+              <a:rPr lang="pt-BR"/>
+              <a:t>2.º Nível da estrutura de tópicos</a:t>
+            </a:r>
+            <a:endParaRPr/>
+          </a:p>
+          <a:p>
+            <a:pPr lvl="2">
               <a:buSzPct val="45000"/>
               <a:buFont typeface="StarSymbol"/>
               <a:buChar char=""/>
             </a:pPr>
             <a:r>
               <a:rPr lang="pt-BR"/>
-              <a:t>2.º Nível da estrutura de tópicos</a:t>
+              <a:t>3.º Nível da estrutura de tópicos</a:t>
             </a:r>
             <a:endParaRPr/>
           </a:p>
           <a:p>
-            <a:pPr lvl="2">
+            <a:pPr lvl="3">
               <a:buSzPct val="75000"/>
               <a:buFont typeface="StarSymbol"/>
               <a:buChar char=""/>
             </a:pPr>
             <a:r>
               <a:rPr lang="pt-BR"/>
-              <a:t>3.º Nível da estrutura de tópicos</a:t>
+              <a:t>4.º Nível da estrutura de tópicos</a:t>
             </a:r>
             <a:endParaRPr/>
           </a:p>
           <a:p>
-            <a:pPr lvl="3">
+            <a:pPr lvl="4">
               <a:buSzPct val="45000"/>
               <a:buFont typeface="StarSymbol"/>
               <a:buChar char=""/>
-            </a:pPr>
-            <a:r>
-              <a:rPr lang="pt-BR"/>
-              <a:t>4.º Nível da estrutura de tópicos</a:t>
-            </a:r>
-            <a:endParaRPr/>
-          </a:p>
-          <a:p>
-            <a:pPr lvl="4">
-              <a:buSzPct val="75000"/>
-              <a:buFont typeface="StarSymbol"/>
-              <a:buChar char=""/>
             </a:pPr>
             <a:r>
               <a:rPr lang="pt-BR"/>
@@ -415,37 +2575,24 @@
             </a:r>
             <a:endParaRPr/>
           </a:p>
-          <a:p>
-            <a:pPr lvl="7">
-              <a:buSzPct val="45000"/>
-              <a:buFont typeface="StarSymbol"/>
-              <a:buChar char=""/>
-            </a:pPr>
-            <a:r>
-              <a:rPr lang="pt-BR"/>
-              <a:t>8.º Nível da estrutura de tópicos</a:t>
-            </a:r>
-            <a:endParaRPr/>
-          </a:p>
-          <a:p>
-            <a:pPr lvl="8">
-              <a:buSzPct val="45000"/>
-              <a:buFont typeface="StarSymbol"/>
-              <a:buChar char=""/>
-            </a:pPr>
-            <a:r>
-              <a:rPr lang="pt-BR"/>
-              <a:t>9.º Nível da estrutura de tópicos</a:t>
-            </a:r>
-            <a:endParaRPr/>
-          </a:p>
         </p:txBody>
       </p:sp>
     </p:spTree>
   </p:cSld>
   <p:clrMap accent1="accent1" accent2="accent2" accent3="accent3" accent4="accent4" accent5="accent5" accent6="accent6" bg1="lt1" bg2="lt2" folHlink="folHlink" hlink="hlink" tx1="dk1" tx2="dk2"/>
   <p:sldLayoutIdLst>
-    <p:sldLayoutId id="2147483651" r:id="rId2"/>
+    <p:sldLayoutId id="2147483662" r:id="rId2"/>
+    <p:sldLayoutId id="2147483663" r:id="rId3"/>
+    <p:sldLayoutId id="2147483664" r:id="rId4"/>
+    <p:sldLayoutId id="2147483665" r:id="rId5"/>
+    <p:sldLayoutId id="2147483666" r:id="rId6"/>
+    <p:sldLayoutId id="2147483667" r:id="rId7"/>
+    <p:sldLayoutId id="2147483668" r:id="rId8"/>
+    <p:sldLayoutId id="2147483669" r:id="rId9"/>
+    <p:sldLayoutId id="2147483670" r:id="rId10"/>
+    <p:sldLayoutId id="2147483671" r:id="rId11"/>
+    <p:sldLayoutId id="2147483672" r:id="rId12"/>
+    <p:sldLayoutId id="2147483673" r:id="rId13"/>
   </p:sldLayoutIdLst>
 </p:sldMaster>
 </file>
@@ -469,14 +2616,14 @@
       </p:grpSpPr>
       <p:sp>
         <p:nvSpPr>
-          <p:cNvPr id="4" name="CustomShape 1"/>
+          <p:cNvPr id="68" name="CustomShape 1"/>
           <p:cNvSpPr/>
           <p:nvPr/>
         </p:nvSpPr>
         <p:spPr>
           <a:xfrm>
             <a:off x="685800" y="2130480"/>
-            <a:ext cx="7771680" cy="1469160"/>
+            <a:ext cx="7771320" cy="1468800"/>
           </a:xfrm>
           <a:prstGeom prst="rect">
             <a:avLst/>
@@ -505,14 +2652,14 @@
       </p:sp>
       <p:sp>
         <p:nvSpPr>
-          <p:cNvPr id="5" name="CustomShape 2"/>
+          <p:cNvPr id="69" name="CustomShape 2"/>
           <p:cNvSpPr/>
           <p:nvPr/>
         </p:nvSpPr>
         <p:spPr>
           <a:xfrm>
             <a:off x="1371600" y="3886200"/>
-            <a:ext cx="6400080" cy="1751760"/>
+            <a:ext cx="6399720" cy="1751400"/>
           </a:xfrm>
           <a:prstGeom prst="rect">
             <a:avLst/>
@@ -592,14 +2739,14 @@
       </p:grpSpPr>
       <p:sp>
         <p:nvSpPr>
-          <p:cNvPr id="6" name="CustomShape 1"/>
+          <p:cNvPr id="70" name="CustomShape 1"/>
           <p:cNvSpPr/>
           <p:nvPr/>
         </p:nvSpPr>
         <p:spPr>
           <a:xfrm>
             <a:off x="457200" y="274680"/>
-            <a:ext cx="8228880" cy="1142280"/>
+            <a:ext cx="8228520" cy="1141920"/>
           </a:xfrm>
           <a:prstGeom prst="rect">
             <a:avLst/>
@@ -628,14 +2775,14 @@
       </p:sp>
       <p:sp>
         <p:nvSpPr>
-          <p:cNvPr id="7" name="CustomShape 2"/>
+          <p:cNvPr id="71" name="CustomShape 2"/>
           <p:cNvSpPr/>
           <p:nvPr/>
         </p:nvSpPr>
         <p:spPr>
           <a:xfrm>
             <a:off x="457200" y="1600200"/>
-            <a:ext cx="8228880" cy="4525200"/>
+            <a:ext cx="8228520" cy="4524840"/>
           </a:xfrm>
           <a:prstGeom prst="rect">
             <a:avLst/>
@@ -659,7 +2806,7 @@
                 </a:solidFill>
                 <a:latin typeface="Calibri"/>
               </a:rPr>
-              <a:t>Esta é a pagina 2</a:t>
+              <a:t>Esta é a página 2</a:t>
             </a:r>
             <a:endParaRPr/>
           </a:p>
@@ -718,14 +2865,14 @@
       </p:grpSpPr>
       <p:sp>
         <p:nvSpPr>
-          <p:cNvPr id="8" name="CustomShape 1"/>
+          <p:cNvPr id="72" name="CustomShape 1"/>
           <p:cNvSpPr/>
           <p:nvPr/>
         </p:nvSpPr>
         <p:spPr>
           <a:xfrm>
             <a:off x="457200" y="274680"/>
-            <a:ext cx="8228880" cy="1142280"/>
+            <a:ext cx="8228520" cy="1141920"/>
           </a:xfrm>
           <a:prstGeom prst="rect">
             <a:avLst/>
@@ -754,14 +2901,14 @@
       </p:sp>
       <p:sp>
         <p:nvSpPr>
-          <p:cNvPr id="9" name="CustomShape 2"/>
+          <p:cNvPr id="73" name="CustomShape 2"/>
           <p:cNvSpPr/>
           <p:nvPr/>
         </p:nvSpPr>
         <p:spPr>
           <a:xfrm>
             <a:off x="457200" y="1600200"/>
-            <a:ext cx="8228880" cy="4525200"/>
+            <a:ext cx="8228520" cy="4524840"/>
           </a:xfrm>
           <a:prstGeom prst="rect">
             <a:avLst/>
@@ -785,7 +2932,7 @@
                 </a:solidFill>
                 <a:latin typeface="Calibri"/>
               </a:rPr>
-              <a:t>Esta é a pagina 3</a:t>
+              <a:t>Esta é a página 3</a:t>
             </a:r>
             <a:endParaRPr/>
           </a:p>
@@ -844,14 +2991,14 @@
       </p:grpSpPr>
       <p:sp>
         <p:nvSpPr>
-          <p:cNvPr id="10" name="CustomShape 1"/>
+          <p:cNvPr id="74" name="CustomShape 1"/>
           <p:cNvSpPr/>
           <p:nvPr/>
         </p:nvSpPr>
         <p:spPr>
           <a:xfrm>
             <a:off x="457200" y="274680"/>
-            <a:ext cx="8228880" cy="1142280"/>
+            <a:ext cx="8228520" cy="1141920"/>
           </a:xfrm>
           <a:prstGeom prst="rect">
             <a:avLst/>
@@ -880,14 +3027,14 @@
       </p:sp>
       <p:sp>
         <p:nvSpPr>
-          <p:cNvPr id="11" name="CustomShape 2"/>
+          <p:cNvPr id="75" name="CustomShape 2"/>
           <p:cNvSpPr/>
           <p:nvPr/>
         </p:nvSpPr>
         <p:spPr>
           <a:xfrm>
             <a:off x="457200" y="1600200"/>
-            <a:ext cx="8228880" cy="4525200"/>
+            <a:ext cx="8228520" cy="4524840"/>
           </a:xfrm>
           <a:prstGeom prst="rect">
             <a:avLst/>
@@ -970,14 +3117,14 @@
       </p:grpSpPr>
       <p:sp>
         <p:nvSpPr>
-          <p:cNvPr id="12" name="CustomShape 1"/>
+          <p:cNvPr id="76" name="CustomShape 1"/>
           <p:cNvSpPr/>
           <p:nvPr/>
         </p:nvSpPr>
         <p:spPr>
           <a:xfrm>
             <a:off x="457200" y="274680"/>
-            <a:ext cx="8228880" cy="1142280"/>
+            <a:ext cx="8228520" cy="1141920"/>
           </a:xfrm>
           <a:prstGeom prst="rect">
             <a:avLst/>
@@ -1006,14 +3153,14 @@
       </p:sp>
       <p:sp>
         <p:nvSpPr>
-          <p:cNvPr id="13" name="CustomShape 2"/>
+          <p:cNvPr id="77" name="CustomShape 2"/>
           <p:cNvSpPr/>
           <p:nvPr/>
         </p:nvSpPr>
         <p:spPr>
           <a:xfrm>
             <a:off x="457200" y="1600200"/>
-            <a:ext cx="8228880" cy="4525200"/>
+            <a:ext cx="8228520" cy="4524840"/>
           </a:xfrm>
           <a:prstGeom prst="rect">
             <a:avLst/>

</xml_diff>